<commit_message>
fixed mtb_compare_specs, main_nav, implemented bs select and more
</commit_message>
<xml_diff>
--- a/assets/images/raw.pptx
+++ b/assets/images/raw.pptx
@@ -6,6 +6,7 @@
   </p:sldMasterIdLst>
   <p:sldIdLst>
     <p:sldId id="256" r:id="rId2"/>
+    <p:sldId id="257" r:id="rId3"/>
   </p:sldIdLst>
   <p:sldSz cx="12192000" cy="6858000"/>
   <p:notesSz cx="6858000" cy="9144000"/>
@@ -104,6 +105,11 @@
       </a:defRPr>
     </a:lvl9pPr>
   </p:defaultTextStyle>
+  <p:extLst>
+    <p:ext uri="{EFAFB233-063F-42B5-8137-9DF3F51BA10A}">
+      <p15:sldGuideLst xmlns:p15="http://schemas.microsoft.com/office/powerpoint/2012/main"/>
+    </p:ext>
+  </p:extLst>
 </p:presentation>
 </file>
 
@@ -256,7 +262,7 @@
           <a:p>
             <a:fld id="{57BFE527-FE1D-423E-9D0C-B83608467F47}" type="datetimeFigureOut">
               <a:rPr lang="en-PH" smtClean="0"/>
-              <a:t>19 Feb 2020</a:t>
+              <a:t>26 Feb 2020</a:t>
             </a:fld>
             <a:endParaRPr lang="en-PH"/>
           </a:p>
@@ -456,7 +462,7 @@
           <a:p>
             <a:fld id="{57BFE527-FE1D-423E-9D0C-B83608467F47}" type="datetimeFigureOut">
               <a:rPr lang="en-PH" smtClean="0"/>
-              <a:t>19 Feb 2020</a:t>
+              <a:t>26 Feb 2020</a:t>
             </a:fld>
             <a:endParaRPr lang="en-PH"/>
           </a:p>
@@ -666,7 +672,7 @@
           <a:p>
             <a:fld id="{57BFE527-FE1D-423E-9D0C-B83608467F47}" type="datetimeFigureOut">
               <a:rPr lang="en-PH" smtClean="0"/>
-              <a:t>19 Feb 2020</a:t>
+              <a:t>26 Feb 2020</a:t>
             </a:fld>
             <a:endParaRPr lang="en-PH"/>
           </a:p>
@@ -866,7 +872,7 @@
           <a:p>
             <a:fld id="{57BFE527-FE1D-423E-9D0C-B83608467F47}" type="datetimeFigureOut">
               <a:rPr lang="en-PH" smtClean="0"/>
-              <a:t>19 Feb 2020</a:t>
+              <a:t>26 Feb 2020</a:t>
             </a:fld>
             <a:endParaRPr lang="en-PH"/>
           </a:p>
@@ -1142,7 +1148,7 @@
           <a:p>
             <a:fld id="{57BFE527-FE1D-423E-9D0C-B83608467F47}" type="datetimeFigureOut">
               <a:rPr lang="en-PH" smtClean="0"/>
-              <a:t>19 Feb 2020</a:t>
+              <a:t>26 Feb 2020</a:t>
             </a:fld>
             <a:endParaRPr lang="en-PH"/>
           </a:p>
@@ -1410,7 +1416,7 @@
           <a:p>
             <a:fld id="{57BFE527-FE1D-423E-9D0C-B83608467F47}" type="datetimeFigureOut">
               <a:rPr lang="en-PH" smtClean="0"/>
-              <a:t>19 Feb 2020</a:t>
+              <a:t>26 Feb 2020</a:t>
             </a:fld>
             <a:endParaRPr lang="en-PH"/>
           </a:p>
@@ -1825,7 +1831,7 @@
           <a:p>
             <a:fld id="{57BFE527-FE1D-423E-9D0C-B83608467F47}" type="datetimeFigureOut">
               <a:rPr lang="en-PH" smtClean="0"/>
-              <a:t>19 Feb 2020</a:t>
+              <a:t>26 Feb 2020</a:t>
             </a:fld>
             <a:endParaRPr lang="en-PH"/>
           </a:p>
@@ -1967,7 +1973,7 @@
           <a:p>
             <a:fld id="{57BFE527-FE1D-423E-9D0C-B83608467F47}" type="datetimeFigureOut">
               <a:rPr lang="en-PH" smtClean="0"/>
-              <a:t>19 Feb 2020</a:t>
+              <a:t>26 Feb 2020</a:t>
             </a:fld>
             <a:endParaRPr lang="en-PH"/>
           </a:p>
@@ -2080,7 +2086,7 @@
           <a:p>
             <a:fld id="{57BFE527-FE1D-423E-9D0C-B83608467F47}" type="datetimeFigureOut">
               <a:rPr lang="en-PH" smtClean="0"/>
-              <a:t>19 Feb 2020</a:t>
+              <a:t>26 Feb 2020</a:t>
             </a:fld>
             <a:endParaRPr lang="en-PH"/>
           </a:p>
@@ -2393,7 +2399,7 @@
           <a:p>
             <a:fld id="{57BFE527-FE1D-423E-9D0C-B83608467F47}" type="datetimeFigureOut">
               <a:rPr lang="en-PH" smtClean="0"/>
-              <a:t>19 Feb 2020</a:t>
+              <a:t>26 Feb 2020</a:t>
             </a:fld>
             <a:endParaRPr lang="en-PH"/>
           </a:p>
@@ -2682,7 +2688,7 @@
           <a:p>
             <a:fld id="{57BFE527-FE1D-423E-9D0C-B83608467F47}" type="datetimeFigureOut">
               <a:rPr lang="en-PH" smtClean="0"/>
-              <a:t>19 Feb 2020</a:t>
+              <a:t>26 Feb 2020</a:t>
             </a:fld>
             <a:endParaRPr lang="en-PH"/>
           </a:p>
@@ -2925,7 +2931,7 @@
           <a:p>
             <a:fld id="{57BFE527-FE1D-423E-9D0C-B83608467F47}" type="datetimeFigureOut">
               <a:rPr lang="en-PH" smtClean="0"/>
-              <a:t>19 Feb 2020</a:t>
+              <a:t>26 Feb 2020</a:t>
             </a:fld>
             <a:endParaRPr lang="en-PH"/>
           </a:p>
@@ -3425,6 +3431,785 @@
 </p:sld>
 </file>
 
+<file path=ppt/slides/slide2.xml><?xml version="1.0" encoding="utf-8"?>
+<p:sld xmlns:a="http://schemas.openxmlformats.org/drawingml/2006/main" xmlns:r="http://schemas.openxmlformats.org/officeDocument/2006/relationships" xmlns:p="http://schemas.openxmlformats.org/presentationml/2006/main">
+  <p:cSld>
+    <p:bg>
+      <p:bgPr>
+        <a:solidFill>
+          <a:schemeClr val="bg1">
+            <a:lumMod val="85000"/>
+          </a:schemeClr>
+        </a:solidFill>
+        <a:effectLst/>
+      </p:bgPr>
+    </p:bg>
+    <p:spTree>
+      <p:nvGrpSpPr>
+        <p:cNvPr id="1" name=""/>
+        <p:cNvGrpSpPr/>
+        <p:nvPr/>
+      </p:nvGrpSpPr>
+      <p:grpSpPr>
+        <a:xfrm>
+          <a:off x="0" y="0"/>
+          <a:ext cx="0" cy="0"/>
+          <a:chOff x="0" y="0"/>
+          <a:chExt cx="0" cy="0"/>
+        </a:xfrm>
+      </p:grpSpPr>
+      <p:sp>
+        <p:nvSpPr>
+          <p:cNvPr id="4" name="Rectangle 3">
+            <a:extLst>
+              <a:ext uri="{FF2B5EF4-FFF2-40B4-BE49-F238E27FC236}">
+                <a16:creationId xmlns:a16="http://schemas.microsoft.com/office/drawing/2014/main" id="{963769EE-64E2-4352-A8DF-DE3C5AFA009F}"/>
+              </a:ext>
+            </a:extLst>
+          </p:cNvPr>
+          <p:cNvSpPr/>
+          <p:nvPr/>
+        </p:nvSpPr>
+        <p:spPr>
+          <a:xfrm>
+            <a:off x="515155" y="399246"/>
+            <a:ext cx="437882" cy="2395470"/>
+          </a:xfrm>
+          <a:prstGeom prst="rect">
+            <a:avLst/>
+          </a:prstGeom>
+          <a:solidFill>
+            <a:schemeClr val="bg1"/>
+          </a:solidFill>
+          <a:ln>
+            <a:noFill/>
+          </a:ln>
+        </p:spPr>
+        <p:style>
+          <a:lnRef idx="2">
+            <a:schemeClr val="accent1">
+              <a:shade val="50000"/>
+            </a:schemeClr>
+          </a:lnRef>
+          <a:fillRef idx="1">
+            <a:schemeClr val="accent1"/>
+          </a:fillRef>
+          <a:effectRef idx="0">
+            <a:schemeClr val="accent1"/>
+          </a:effectRef>
+          <a:fontRef idx="minor">
+            <a:schemeClr val="lt1"/>
+          </a:fontRef>
+        </p:style>
+        <p:txBody>
+          <a:bodyPr rtlCol="0" anchor="ctr"/>
+          <a:lstStyle/>
+          <a:p>
+            <a:pPr algn="ctr"/>
+            <a:endParaRPr lang="en-PH"/>
+          </a:p>
+        </p:txBody>
+      </p:sp>
+      <p:sp>
+        <p:nvSpPr>
+          <p:cNvPr id="5" name="Rectangle 4">
+            <a:extLst>
+              <a:ext uri="{FF2B5EF4-FFF2-40B4-BE49-F238E27FC236}">
+                <a16:creationId xmlns:a16="http://schemas.microsoft.com/office/drawing/2014/main" id="{EB9FAF82-995C-41ED-A41F-AB39817B3EE8}"/>
+              </a:ext>
+            </a:extLst>
+          </p:cNvPr>
+          <p:cNvSpPr/>
+          <p:nvPr/>
+        </p:nvSpPr>
+        <p:spPr>
+          <a:xfrm>
+            <a:off x="1257837" y="1197736"/>
+            <a:ext cx="437882" cy="1030310"/>
+          </a:xfrm>
+          <a:prstGeom prst="rect">
+            <a:avLst/>
+          </a:prstGeom>
+          <a:solidFill>
+            <a:schemeClr val="bg1"/>
+          </a:solidFill>
+          <a:ln>
+            <a:noFill/>
+          </a:ln>
+        </p:spPr>
+        <p:style>
+          <a:lnRef idx="2">
+            <a:schemeClr val="accent1">
+              <a:shade val="50000"/>
+            </a:schemeClr>
+          </a:lnRef>
+          <a:fillRef idx="1">
+            <a:schemeClr val="accent1"/>
+          </a:fillRef>
+          <a:effectRef idx="0">
+            <a:schemeClr val="accent1"/>
+          </a:effectRef>
+          <a:fontRef idx="minor">
+            <a:schemeClr val="lt1"/>
+          </a:fontRef>
+        </p:style>
+        <p:txBody>
+          <a:bodyPr rtlCol="0" anchor="ctr"/>
+          <a:lstStyle/>
+          <a:p>
+            <a:pPr algn="ctr"/>
+            <a:endParaRPr lang="en-PH"/>
+          </a:p>
+        </p:txBody>
+      </p:sp>
+      <p:sp>
+        <p:nvSpPr>
+          <p:cNvPr id="6" name="Rectangle 5">
+            <a:extLst>
+              <a:ext uri="{FF2B5EF4-FFF2-40B4-BE49-F238E27FC236}">
+                <a16:creationId xmlns:a16="http://schemas.microsoft.com/office/drawing/2014/main" id="{76936D18-A1DC-450E-808A-6312F4F08B3E}"/>
+              </a:ext>
+            </a:extLst>
+          </p:cNvPr>
+          <p:cNvSpPr/>
+          <p:nvPr/>
+        </p:nvSpPr>
+        <p:spPr>
+          <a:xfrm>
+            <a:off x="2000519" y="1197736"/>
+            <a:ext cx="437882" cy="1596980"/>
+          </a:xfrm>
+          <a:prstGeom prst="rect">
+            <a:avLst/>
+          </a:prstGeom>
+          <a:solidFill>
+            <a:schemeClr val="bg1"/>
+          </a:solidFill>
+          <a:ln>
+            <a:noFill/>
+          </a:ln>
+        </p:spPr>
+        <p:style>
+          <a:lnRef idx="2">
+            <a:schemeClr val="accent1">
+              <a:shade val="50000"/>
+            </a:schemeClr>
+          </a:lnRef>
+          <a:fillRef idx="1">
+            <a:schemeClr val="accent1"/>
+          </a:fillRef>
+          <a:effectRef idx="0">
+            <a:schemeClr val="accent1"/>
+          </a:effectRef>
+          <a:fontRef idx="minor">
+            <a:schemeClr val="lt1"/>
+          </a:fontRef>
+        </p:style>
+        <p:txBody>
+          <a:bodyPr rtlCol="0" anchor="ctr"/>
+          <a:lstStyle/>
+          <a:p>
+            <a:pPr algn="ctr"/>
+            <a:endParaRPr lang="en-PH"/>
+          </a:p>
+        </p:txBody>
+      </p:sp>
+      <p:sp>
+        <p:nvSpPr>
+          <p:cNvPr id="7" name="Rectangle 6">
+            <a:extLst>
+              <a:ext uri="{FF2B5EF4-FFF2-40B4-BE49-F238E27FC236}">
+                <a16:creationId xmlns:a16="http://schemas.microsoft.com/office/drawing/2014/main" id="{A71016FD-7ECA-4152-9427-AEA9C0422170}"/>
+              </a:ext>
+            </a:extLst>
+          </p:cNvPr>
+          <p:cNvSpPr/>
+          <p:nvPr/>
+        </p:nvSpPr>
+        <p:spPr>
+          <a:xfrm rot="5400000">
+            <a:off x="2088525" y="-448613"/>
+            <a:ext cx="437882" cy="2133599"/>
+          </a:xfrm>
+          <a:prstGeom prst="rect">
+            <a:avLst/>
+          </a:prstGeom>
+          <a:solidFill>
+            <a:schemeClr val="bg1"/>
+          </a:solidFill>
+          <a:ln>
+            <a:noFill/>
+          </a:ln>
+        </p:spPr>
+        <p:style>
+          <a:lnRef idx="2">
+            <a:schemeClr val="accent1">
+              <a:shade val="50000"/>
+            </a:schemeClr>
+          </a:lnRef>
+          <a:fillRef idx="1">
+            <a:schemeClr val="accent1"/>
+          </a:fillRef>
+          <a:effectRef idx="0">
+            <a:schemeClr val="accent1"/>
+          </a:effectRef>
+          <a:fontRef idx="minor">
+            <a:schemeClr val="lt1"/>
+          </a:fontRef>
+        </p:style>
+        <p:txBody>
+          <a:bodyPr rtlCol="0" anchor="ctr"/>
+          <a:lstStyle/>
+          <a:p>
+            <a:pPr algn="ctr"/>
+            <a:endParaRPr lang="en-PH"/>
+          </a:p>
+        </p:txBody>
+      </p:sp>
+      <p:sp>
+        <p:nvSpPr>
+          <p:cNvPr id="8" name="Oval 7">
+            <a:extLst>
+              <a:ext uri="{FF2B5EF4-FFF2-40B4-BE49-F238E27FC236}">
+                <a16:creationId xmlns:a16="http://schemas.microsoft.com/office/drawing/2014/main" id="{A962EF70-B4F4-4963-BAD7-2123206BD08C}"/>
+              </a:ext>
+            </a:extLst>
+          </p:cNvPr>
+          <p:cNvSpPr/>
+          <p:nvPr/>
+        </p:nvSpPr>
+        <p:spPr>
+          <a:xfrm>
+            <a:off x="2743201" y="399246"/>
+            <a:ext cx="1159098" cy="1159098"/>
+          </a:xfrm>
+          <a:prstGeom prst="ellipse">
+            <a:avLst/>
+          </a:prstGeom>
+          <a:solidFill>
+            <a:schemeClr val="bg1"/>
+          </a:solidFill>
+          <a:ln>
+            <a:noFill/>
+          </a:ln>
+        </p:spPr>
+        <p:style>
+          <a:lnRef idx="2">
+            <a:schemeClr val="accent1">
+              <a:shade val="50000"/>
+            </a:schemeClr>
+          </a:lnRef>
+          <a:fillRef idx="1">
+            <a:schemeClr val="accent1"/>
+          </a:fillRef>
+          <a:effectRef idx="0">
+            <a:schemeClr val="accent1"/>
+          </a:effectRef>
+          <a:fontRef idx="minor">
+            <a:schemeClr val="lt1"/>
+          </a:fontRef>
+        </p:style>
+        <p:txBody>
+          <a:bodyPr rtlCol="0" anchor="ctr"/>
+          <a:lstStyle/>
+          <a:p>
+            <a:pPr algn="ctr"/>
+            <a:endParaRPr lang="en-PH"/>
+          </a:p>
+        </p:txBody>
+      </p:sp>
+      <p:sp>
+        <p:nvSpPr>
+          <p:cNvPr id="11" name="Oval 10">
+            <a:extLst>
+              <a:ext uri="{FF2B5EF4-FFF2-40B4-BE49-F238E27FC236}">
+                <a16:creationId xmlns:a16="http://schemas.microsoft.com/office/drawing/2014/main" id="{8285B8EF-C97F-4B57-B46D-871FDB3E80E0}"/>
+              </a:ext>
+            </a:extLst>
+          </p:cNvPr>
+          <p:cNvSpPr/>
+          <p:nvPr/>
+        </p:nvSpPr>
+        <p:spPr>
+          <a:xfrm>
+            <a:off x="2768958" y="1635618"/>
+            <a:ext cx="1159098" cy="1159098"/>
+          </a:xfrm>
+          <a:prstGeom prst="ellipse">
+            <a:avLst/>
+          </a:prstGeom>
+          <a:solidFill>
+            <a:schemeClr val="bg1"/>
+          </a:solidFill>
+          <a:ln>
+            <a:noFill/>
+          </a:ln>
+        </p:spPr>
+        <p:style>
+          <a:lnRef idx="2">
+            <a:schemeClr val="accent1">
+              <a:shade val="50000"/>
+            </a:schemeClr>
+          </a:lnRef>
+          <a:fillRef idx="1">
+            <a:schemeClr val="accent1"/>
+          </a:fillRef>
+          <a:effectRef idx="0">
+            <a:schemeClr val="accent1"/>
+          </a:effectRef>
+          <a:fontRef idx="minor">
+            <a:schemeClr val="lt1"/>
+          </a:fontRef>
+        </p:style>
+        <p:txBody>
+          <a:bodyPr rtlCol="0" anchor="ctr"/>
+          <a:lstStyle/>
+          <a:p>
+            <a:pPr algn="ctr"/>
+            <a:endParaRPr lang="en-PH"/>
+          </a:p>
+        </p:txBody>
+      </p:sp>
+      <p:grpSp>
+        <p:nvGrpSpPr>
+          <p:cNvPr id="22" name="Group 21">
+            <a:extLst>
+              <a:ext uri="{FF2B5EF4-FFF2-40B4-BE49-F238E27FC236}">
+                <a16:creationId xmlns:a16="http://schemas.microsoft.com/office/drawing/2014/main" id="{695AD923-C17B-4065-B716-B91D18C0894C}"/>
+              </a:ext>
+            </a:extLst>
+          </p:cNvPr>
+          <p:cNvGrpSpPr/>
+          <p:nvPr/>
+        </p:nvGrpSpPr>
+        <p:grpSpPr>
+          <a:xfrm>
+            <a:off x="4453093" y="3643778"/>
+            <a:ext cx="2290943" cy="1775947"/>
+            <a:chOff x="4453093" y="3643778"/>
+            <a:chExt cx="2290943" cy="1775947"/>
+          </a:xfrm>
+        </p:grpSpPr>
+        <p:sp>
+          <p:nvSpPr>
+            <p:cNvPr id="20" name="Rectangle: Rounded Corners 19">
+              <a:extLst>
+                <a:ext uri="{FF2B5EF4-FFF2-40B4-BE49-F238E27FC236}">
+                  <a16:creationId xmlns:a16="http://schemas.microsoft.com/office/drawing/2014/main" id="{25216C69-A7B3-46AA-A2AB-1755E93AE291}"/>
+                </a:ext>
+              </a:extLst>
+            </p:cNvPr>
+            <p:cNvSpPr/>
+            <p:nvPr/>
+          </p:nvSpPr>
+          <p:spPr>
+            <a:xfrm>
+              <a:off x="4453093" y="3643778"/>
+              <a:ext cx="2290943" cy="1775947"/>
+            </a:xfrm>
+            <a:prstGeom prst="roundRect">
+              <a:avLst/>
+            </a:prstGeom>
+            <a:solidFill>
+              <a:schemeClr val="bg1"/>
+            </a:solidFill>
+            <a:ln>
+              <a:noFill/>
+            </a:ln>
+          </p:spPr>
+          <p:style>
+            <a:lnRef idx="2">
+              <a:schemeClr val="accent1">
+                <a:shade val="50000"/>
+              </a:schemeClr>
+            </a:lnRef>
+            <a:fillRef idx="1">
+              <a:schemeClr val="accent1"/>
+            </a:fillRef>
+            <a:effectRef idx="0">
+              <a:schemeClr val="accent1"/>
+            </a:effectRef>
+            <a:fontRef idx="minor">
+              <a:schemeClr val="lt1"/>
+            </a:fontRef>
+          </p:style>
+          <p:txBody>
+            <a:bodyPr rtlCol="0" anchor="ctr"/>
+            <a:lstStyle/>
+            <a:p>
+              <a:pPr algn="ctr"/>
+              <a:endParaRPr lang="en-PH"/>
+            </a:p>
+          </p:txBody>
+        </p:sp>
+        <p:grpSp>
+          <p:nvGrpSpPr>
+            <p:cNvPr id="19" name="Group 18">
+              <a:extLst>
+                <a:ext uri="{FF2B5EF4-FFF2-40B4-BE49-F238E27FC236}">
+                  <a16:creationId xmlns:a16="http://schemas.microsoft.com/office/drawing/2014/main" id="{543947DB-84A4-4BDC-B6EF-D3BE9EEC2EDF}"/>
+                </a:ext>
+              </a:extLst>
+            </p:cNvPr>
+            <p:cNvGrpSpPr/>
+            <p:nvPr/>
+          </p:nvGrpSpPr>
+          <p:grpSpPr>
+            <a:xfrm>
+              <a:off x="4663042" y="3915160"/>
+              <a:ext cx="1890093" cy="1276509"/>
+              <a:chOff x="4534005" y="3841748"/>
+              <a:chExt cx="1890093" cy="1276509"/>
+            </a:xfrm>
+          </p:grpSpPr>
+          <p:grpSp>
+            <p:nvGrpSpPr>
+              <p:cNvPr id="14" name="Group 13">
+                <a:extLst>
+                  <a:ext uri="{FF2B5EF4-FFF2-40B4-BE49-F238E27FC236}">
+                    <a16:creationId xmlns:a16="http://schemas.microsoft.com/office/drawing/2014/main" id="{D7E31CA2-7933-484D-8495-4F75FF1B9F41}"/>
+                  </a:ext>
+                </a:extLst>
+              </p:cNvPr>
+              <p:cNvGrpSpPr/>
+              <p:nvPr/>
+            </p:nvGrpSpPr>
+            <p:grpSpPr>
+              <a:xfrm rot="5400000">
+                <a:off x="4903279" y="3785048"/>
+                <a:ext cx="963935" cy="1702484"/>
+                <a:chOff x="5314158" y="3620406"/>
+                <a:chExt cx="1153002" cy="2036412"/>
+              </a:xfrm>
+            </p:grpSpPr>
+            <p:sp>
+              <p:nvSpPr>
+                <p:cNvPr id="12" name="Oval 11">
+                  <a:extLst>
+                    <a:ext uri="{FF2B5EF4-FFF2-40B4-BE49-F238E27FC236}">
+                      <a16:creationId xmlns:a16="http://schemas.microsoft.com/office/drawing/2014/main" id="{48EF739C-6951-4E10-9F8B-252D0756DCD3}"/>
+                    </a:ext>
+                  </a:extLst>
+                </p:cNvPr>
+                <p:cNvSpPr/>
+                <p:nvPr/>
+              </p:nvSpPr>
+              <p:spPr>
+                <a:xfrm rot="1976738">
+                  <a:off x="5314158" y="3620406"/>
+                  <a:ext cx="1153001" cy="800038"/>
+                </a:xfrm>
+                <a:prstGeom prst="ellipse">
+                  <a:avLst/>
+                </a:prstGeom>
+                <a:solidFill>
+                  <a:srgbClr val="7030A0"/>
+                </a:solidFill>
+                <a:ln>
+                  <a:noFill/>
+                </a:ln>
+              </p:spPr>
+              <p:style>
+                <a:lnRef idx="2">
+                  <a:schemeClr val="accent1">
+                    <a:shade val="50000"/>
+                  </a:schemeClr>
+                </a:lnRef>
+                <a:fillRef idx="1">
+                  <a:schemeClr val="accent1"/>
+                </a:fillRef>
+                <a:effectRef idx="0">
+                  <a:schemeClr val="accent1"/>
+                </a:effectRef>
+                <a:fontRef idx="minor">
+                  <a:schemeClr val="lt1"/>
+                </a:fontRef>
+              </p:style>
+              <p:txBody>
+                <a:bodyPr rtlCol="0" anchor="ctr"/>
+                <a:lstStyle/>
+                <a:p>
+                  <a:pPr algn="ctr"/>
+                  <a:endParaRPr lang="en-PH"/>
+                </a:p>
+              </p:txBody>
+            </p:sp>
+            <p:sp>
+              <p:nvSpPr>
+                <p:cNvPr id="13" name="Oval 12">
+                  <a:extLst>
+                    <a:ext uri="{FF2B5EF4-FFF2-40B4-BE49-F238E27FC236}">
+                      <a16:creationId xmlns:a16="http://schemas.microsoft.com/office/drawing/2014/main" id="{E8010FF1-5849-4472-8BAB-724371EA5761}"/>
+                    </a:ext>
+                  </a:extLst>
+                </p:cNvPr>
+                <p:cNvSpPr/>
+                <p:nvPr/>
+              </p:nvSpPr>
+              <p:spPr>
+                <a:xfrm rot="1976738">
+                  <a:off x="5314159" y="4856780"/>
+                  <a:ext cx="1153001" cy="800038"/>
+                </a:xfrm>
+                <a:prstGeom prst="ellipse">
+                  <a:avLst/>
+                </a:prstGeom>
+                <a:solidFill>
+                  <a:srgbClr val="7030A0"/>
+                </a:solidFill>
+                <a:ln>
+                  <a:noFill/>
+                </a:ln>
+              </p:spPr>
+              <p:style>
+                <a:lnRef idx="2">
+                  <a:schemeClr val="accent1">
+                    <a:shade val="50000"/>
+                  </a:schemeClr>
+                </a:lnRef>
+                <a:fillRef idx="1">
+                  <a:schemeClr val="accent1"/>
+                </a:fillRef>
+                <a:effectRef idx="0">
+                  <a:schemeClr val="accent1"/>
+                </a:effectRef>
+                <a:fontRef idx="minor">
+                  <a:schemeClr val="lt1"/>
+                </a:fontRef>
+              </p:style>
+              <p:txBody>
+                <a:bodyPr rtlCol="0" anchor="ctr"/>
+                <a:lstStyle/>
+                <a:p>
+                  <a:pPr algn="ctr"/>
+                  <a:endParaRPr lang="en-PH"/>
+                </a:p>
+              </p:txBody>
+            </p:sp>
+          </p:grpSp>
+          <p:sp>
+            <p:nvSpPr>
+              <p:cNvPr id="15" name="Rectangle 14">
+                <a:extLst>
+                  <a:ext uri="{FF2B5EF4-FFF2-40B4-BE49-F238E27FC236}">
+                    <a16:creationId xmlns:a16="http://schemas.microsoft.com/office/drawing/2014/main" id="{0545D9B0-A7CC-4856-ABA6-4358848345BE}"/>
+                  </a:ext>
+                </a:extLst>
+              </p:cNvPr>
+              <p:cNvSpPr/>
+              <p:nvPr/>
+            </p:nvSpPr>
+            <p:spPr>
+              <a:xfrm>
+                <a:off x="4774254" y="4019628"/>
+                <a:ext cx="208208" cy="675271"/>
+              </a:xfrm>
+              <a:prstGeom prst="rect">
+                <a:avLst/>
+              </a:prstGeom>
+              <a:solidFill>
+                <a:srgbClr val="FFC000"/>
+              </a:solidFill>
+              <a:ln>
+                <a:noFill/>
+              </a:ln>
+            </p:spPr>
+            <p:style>
+              <a:lnRef idx="2">
+                <a:schemeClr val="accent1">
+                  <a:shade val="50000"/>
+                </a:schemeClr>
+              </a:lnRef>
+              <a:fillRef idx="1">
+                <a:schemeClr val="accent1"/>
+              </a:fillRef>
+              <a:effectRef idx="0">
+                <a:schemeClr val="accent1"/>
+              </a:effectRef>
+              <a:fontRef idx="minor">
+                <a:schemeClr val="lt1"/>
+              </a:fontRef>
+            </p:style>
+            <p:txBody>
+              <a:bodyPr rtlCol="0" anchor="ctr"/>
+              <a:lstStyle/>
+              <a:p>
+                <a:pPr algn="ctr"/>
+                <a:endParaRPr lang="en-PH"/>
+              </a:p>
+            </p:txBody>
+          </p:sp>
+          <p:sp>
+            <p:nvSpPr>
+              <p:cNvPr id="16" name="Rectangle 15">
+                <a:extLst>
+                  <a:ext uri="{FF2B5EF4-FFF2-40B4-BE49-F238E27FC236}">
+                    <a16:creationId xmlns:a16="http://schemas.microsoft.com/office/drawing/2014/main" id="{55E0DC8C-2821-439E-BA90-CAEA78EF1FF5}"/>
+                  </a:ext>
+                </a:extLst>
+              </p:cNvPr>
+              <p:cNvSpPr/>
+              <p:nvPr/>
+            </p:nvSpPr>
+            <p:spPr>
+              <a:xfrm>
+                <a:off x="5807887" y="3873423"/>
+                <a:ext cx="208208" cy="821477"/>
+              </a:xfrm>
+              <a:prstGeom prst="rect">
+                <a:avLst/>
+              </a:prstGeom>
+              <a:solidFill>
+                <a:srgbClr val="FFC000"/>
+              </a:solidFill>
+              <a:ln>
+                <a:noFill/>
+              </a:ln>
+            </p:spPr>
+            <p:style>
+              <a:lnRef idx="2">
+                <a:schemeClr val="accent1">
+                  <a:shade val="50000"/>
+                </a:schemeClr>
+              </a:lnRef>
+              <a:fillRef idx="1">
+                <a:schemeClr val="accent1"/>
+              </a:fillRef>
+              <a:effectRef idx="0">
+                <a:schemeClr val="accent1"/>
+              </a:effectRef>
+              <a:fontRef idx="minor">
+                <a:schemeClr val="lt1"/>
+              </a:fontRef>
+            </p:style>
+            <p:txBody>
+              <a:bodyPr rtlCol="0" anchor="ctr"/>
+              <a:lstStyle/>
+              <a:p>
+                <a:pPr algn="ctr"/>
+                <a:endParaRPr lang="en-PH"/>
+              </a:p>
+            </p:txBody>
+          </p:sp>
+          <p:sp>
+            <p:nvSpPr>
+              <p:cNvPr id="17" name="Rectangle 16">
+                <a:extLst>
+                  <a:ext uri="{FF2B5EF4-FFF2-40B4-BE49-F238E27FC236}">
+                    <a16:creationId xmlns:a16="http://schemas.microsoft.com/office/drawing/2014/main" id="{E8D45E34-FD9F-4F38-BACB-4045A94E0BC1}"/>
+                  </a:ext>
+                </a:extLst>
+              </p:cNvPr>
+              <p:cNvSpPr/>
+              <p:nvPr/>
+            </p:nvSpPr>
+            <p:spPr>
+              <a:xfrm>
+                <a:off x="5291070" y="4295775"/>
+                <a:ext cx="208208" cy="399126"/>
+              </a:xfrm>
+              <a:prstGeom prst="rect">
+                <a:avLst/>
+              </a:prstGeom>
+              <a:solidFill>
+                <a:srgbClr val="FFC000"/>
+              </a:solidFill>
+              <a:ln>
+                <a:noFill/>
+              </a:ln>
+            </p:spPr>
+            <p:style>
+              <a:lnRef idx="2">
+                <a:schemeClr val="accent1">
+                  <a:shade val="50000"/>
+                </a:schemeClr>
+              </a:lnRef>
+              <a:fillRef idx="1">
+                <a:schemeClr val="accent1"/>
+              </a:fillRef>
+              <a:effectRef idx="0">
+                <a:schemeClr val="accent1"/>
+              </a:effectRef>
+              <a:fontRef idx="minor">
+                <a:schemeClr val="lt1"/>
+              </a:fontRef>
+            </p:style>
+            <p:txBody>
+              <a:bodyPr rtlCol="0" anchor="ctr"/>
+              <a:lstStyle/>
+              <a:p>
+                <a:pPr algn="ctr"/>
+                <a:endParaRPr lang="en-PH" dirty="0"/>
+              </a:p>
+            </p:txBody>
+          </p:sp>
+          <p:sp>
+            <p:nvSpPr>
+              <p:cNvPr id="18" name="Rectangle 17">
+                <a:extLst>
+                  <a:ext uri="{FF2B5EF4-FFF2-40B4-BE49-F238E27FC236}">
+                    <a16:creationId xmlns:a16="http://schemas.microsoft.com/office/drawing/2014/main" id="{415D6F46-DC21-411E-97D7-D06D2DC2F87F}"/>
+                  </a:ext>
+                </a:extLst>
+              </p:cNvPr>
+              <p:cNvSpPr/>
+              <p:nvPr/>
+            </p:nvSpPr>
+            <p:spPr>
+              <a:xfrm rot="5400000">
+                <a:off x="5495072" y="3120929"/>
+                <a:ext cx="208208" cy="1649845"/>
+              </a:xfrm>
+              <a:prstGeom prst="rect">
+                <a:avLst/>
+              </a:prstGeom>
+              <a:solidFill>
+                <a:srgbClr val="FFC000"/>
+              </a:solidFill>
+              <a:ln>
+                <a:noFill/>
+              </a:ln>
+            </p:spPr>
+            <p:style>
+              <a:lnRef idx="2">
+                <a:schemeClr val="accent1">
+                  <a:shade val="50000"/>
+                </a:schemeClr>
+              </a:lnRef>
+              <a:fillRef idx="1">
+                <a:schemeClr val="accent1"/>
+              </a:fillRef>
+              <a:effectRef idx="0">
+                <a:schemeClr val="accent1"/>
+              </a:effectRef>
+              <a:fontRef idx="minor">
+                <a:schemeClr val="lt1"/>
+              </a:fontRef>
+            </p:style>
+            <p:txBody>
+              <a:bodyPr rtlCol="0" anchor="ctr"/>
+              <a:lstStyle/>
+              <a:p>
+                <a:pPr algn="ctr"/>
+                <a:endParaRPr lang="en-PH"/>
+              </a:p>
+            </p:txBody>
+          </p:sp>
+        </p:grpSp>
+      </p:grpSp>
+    </p:spTree>
+    <p:extLst>
+      <p:ext uri="{BB962C8B-B14F-4D97-AF65-F5344CB8AC3E}">
+        <p14:creationId xmlns:p14="http://schemas.microsoft.com/office/powerpoint/2010/main" val="1130468912"/>
+      </p:ext>
+    </p:extLst>
+  </p:cSld>
+  <p:clrMapOvr>
+    <a:masterClrMapping/>
+  </p:clrMapOvr>
+</p:sld>
+</file>
+
 <file path=ppt/theme/theme1.xml><?xml version="1.0" encoding="utf-8"?>
 <a:theme xmlns:a="http://schemas.openxmlformats.org/drawingml/2006/main" name="Office Theme">
   <a:themeElements>

</xml_diff>

<commit_message>
added photo in modal login, changed favicon on both page head and main nav, some styling enhancement, added favion photos, added bike_finder widget, made spinner icon on changeBikeInput according to ajax before and success.
</commit_message>
<xml_diff>
--- a/assets/images/raw.pptx
+++ b/assets/images/raw.pptx
@@ -7,6 +7,7 @@
   <p:sldIdLst>
     <p:sldId id="256" r:id="rId2"/>
     <p:sldId id="257" r:id="rId3"/>
+    <p:sldId id="258" r:id="rId4"/>
   </p:sldIdLst>
   <p:sldSz cx="12192000" cy="6858000"/>
   <p:notesSz cx="6858000" cy="9144000"/>
@@ -262,7 +263,7 @@
           <a:p>
             <a:fld id="{57BFE527-FE1D-423E-9D0C-B83608467F47}" type="datetimeFigureOut">
               <a:rPr lang="en-PH" smtClean="0"/>
-              <a:t>26 Feb 2020</a:t>
+              <a:t>3 Mar 2020</a:t>
             </a:fld>
             <a:endParaRPr lang="en-PH"/>
           </a:p>
@@ -462,7 +463,7 @@
           <a:p>
             <a:fld id="{57BFE527-FE1D-423E-9D0C-B83608467F47}" type="datetimeFigureOut">
               <a:rPr lang="en-PH" smtClean="0"/>
-              <a:t>26 Feb 2020</a:t>
+              <a:t>3 Mar 2020</a:t>
             </a:fld>
             <a:endParaRPr lang="en-PH"/>
           </a:p>
@@ -672,7 +673,7 @@
           <a:p>
             <a:fld id="{57BFE527-FE1D-423E-9D0C-B83608467F47}" type="datetimeFigureOut">
               <a:rPr lang="en-PH" smtClean="0"/>
-              <a:t>26 Feb 2020</a:t>
+              <a:t>3 Mar 2020</a:t>
             </a:fld>
             <a:endParaRPr lang="en-PH"/>
           </a:p>
@@ -872,7 +873,7 @@
           <a:p>
             <a:fld id="{57BFE527-FE1D-423E-9D0C-B83608467F47}" type="datetimeFigureOut">
               <a:rPr lang="en-PH" smtClean="0"/>
-              <a:t>26 Feb 2020</a:t>
+              <a:t>3 Mar 2020</a:t>
             </a:fld>
             <a:endParaRPr lang="en-PH"/>
           </a:p>
@@ -1148,7 +1149,7 @@
           <a:p>
             <a:fld id="{57BFE527-FE1D-423E-9D0C-B83608467F47}" type="datetimeFigureOut">
               <a:rPr lang="en-PH" smtClean="0"/>
-              <a:t>26 Feb 2020</a:t>
+              <a:t>3 Mar 2020</a:t>
             </a:fld>
             <a:endParaRPr lang="en-PH"/>
           </a:p>
@@ -1416,7 +1417,7 @@
           <a:p>
             <a:fld id="{57BFE527-FE1D-423E-9D0C-B83608467F47}" type="datetimeFigureOut">
               <a:rPr lang="en-PH" smtClean="0"/>
-              <a:t>26 Feb 2020</a:t>
+              <a:t>3 Mar 2020</a:t>
             </a:fld>
             <a:endParaRPr lang="en-PH"/>
           </a:p>
@@ -1831,7 +1832,7 @@
           <a:p>
             <a:fld id="{57BFE527-FE1D-423E-9D0C-B83608467F47}" type="datetimeFigureOut">
               <a:rPr lang="en-PH" smtClean="0"/>
-              <a:t>26 Feb 2020</a:t>
+              <a:t>3 Mar 2020</a:t>
             </a:fld>
             <a:endParaRPr lang="en-PH"/>
           </a:p>
@@ -1973,7 +1974,7 @@
           <a:p>
             <a:fld id="{57BFE527-FE1D-423E-9D0C-B83608467F47}" type="datetimeFigureOut">
               <a:rPr lang="en-PH" smtClean="0"/>
-              <a:t>26 Feb 2020</a:t>
+              <a:t>3 Mar 2020</a:t>
             </a:fld>
             <a:endParaRPr lang="en-PH"/>
           </a:p>
@@ -2086,7 +2087,7 @@
           <a:p>
             <a:fld id="{57BFE527-FE1D-423E-9D0C-B83608467F47}" type="datetimeFigureOut">
               <a:rPr lang="en-PH" smtClean="0"/>
-              <a:t>26 Feb 2020</a:t>
+              <a:t>3 Mar 2020</a:t>
             </a:fld>
             <a:endParaRPr lang="en-PH"/>
           </a:p>
@@ -2399,7 +2400,7 @@
           <a:p>
             <a:fld id="{57BFE527-FE1D-423E-9D0C-B83608467F47}" type="datetimeFigureOut">
               <a:rPr lang="en-PH" smtClean="0"/>
-              <a:t>26 Feb 2020</a:t>
+              <a:t>3 Mar 2020</a:t>
             </a:fld>
             <a:endParaRPr lang="en-PH"/>
           </a:p>
@@ -2688,7 +2689,7 @@
           <a:p>
             <a:fld id="{57BFE527-FE1D-423E-9D0C-B83608467F47}" type="datetimeFigureOut">
               <a:rPr lang="en-PH" smtClean="0"/>
-              <a:t>26 Feb 2020</a:t>
+              <a:t>3 Mar 2020</a:t>
             </a:fld>
             <a:endParaRPr lang="en-PH"/>
           </a:p>
@@ -2765,9 +2766,14 @@
 <p:sldMaster xmlns:a="http://schemas.openxmlformats.org/drawingml/2006/main" xmlns:r="http://schemas.openxmlformats.org/officeDocument/2006/relationships" xmlns:p="http://schemas.openxmlformats.org/presentationml/2006/main">
   <p:cSld>
     <p:bg>
-      <p:bgRef idx="1001">
-        <a:schemeClr val="bg1"/>
-      </p:bgRef>
+      <p:bgPr>
+        <a:solidFill>
+          <a:schemeClr val="bg1">
+            <a:lumMod val="85000"/>
+          </a:schemeClr>
+        </a:solidFill>
+        <a:effectLst/>
+      </p:bgPr>
     </p:bg>
     <p:spTree>
       <p:nvGrpSpPr>
@@ -2931,7 +2937,7 @@
           <a:p>
             <a:fld id="{57BFE527-FE1D-423E-9D0C-B83608467F47}" type="datetimeFigureOut">
               <a:rPr lang="en-PH" smtClean="0"/>
-              <a:t>26 Feb 2020</a:t>
+              <a:t>3 Mar 2020</a:t>
             </a:fld>
             <a:endParaRPr lang="en-PH"/>
           </a:p>
@@ -3434,16 +3440,6 @@
 <file path=ppt/slides/slide2.xml><?xml version="1.0" encoding="utf-8"?>
 <p:sld xmlns:a="http://schemas.openxmlformats.org/drawingml/2006/main" xmlns:r="http://schemas.openxmlformats.org/officeDocument/2006/relationships" xmlns:p="http://schemas.openxmlformats.org/presentationml/2006/main">
   <p:cSld>
-    <p:bg>
-      <p:bgPr>
-        <a:solidFill>
-          <a:schemeClr val="bg1">
-            <a:lumMod val="85000"/>
-          </a:schemeClr>
-        </a:solidFill>
-        <a:effectLst/>
-      </p:bgPr>
-    </p:bg>
     <p:spTree>
       <p:nvGrpSpPr>
         <p:cNvPr id="1" name=""/>
@@ -3784,7 +3780,7 @@
         </p:nvGrpSpPr>
         <p:grpSpPr>
           <a:xfrm>
-            <a:off x="4453093" y="3643778"/>
+            <a:off x="452258" y="3741981"/>
             <a:ext cx="2290943" cy="1775947"/>
             <a:chOff x="4453093" y="3643778"/>
             <a:chExt cx="2290943" cy="1775947"/>
@@ -4197,10 +4193,1722 @@
           </p:sp>
         </p:grpSp>
       </p:grpSp>
+      <p:sp>
+        <p:nvSpPr>
+          <p:cNvPr id="3" name="Block Arc 2">
+            <a:extLst>
+              <a:ext uri="{FF2B5EF4-FFF2-40B4-BE49-F238E27FC236}">
+                <a16:creationId xmlns:a16="http://schemas.microsoft.com/office/drawing/2014/main" id="{21A03AE5-7C5E-4468-A9DF-E19291511E42}"/>
+              </a:ext>
+            </a:extLst>
+          </p:cNvPr>
+          <p:cNvSpPr/>
+          <p:nvPr/>
+        </p:nvSpPr>
+        <p:spPr>
+          <a:xfrm>
+            <a:off x="5492838" y="3385788"/>
+            <a:ext cx="1918952" cy="1918952"/>
+          </a:xfrm>
+          <a:prstGeom prst="blockArc">
+            <a:avLst>
+              <a:gd name="adj1" fmla="val 10800000"/>
+              <a:gd name="adj2" fmla="val 21390850"/>
+              <a:gd name="adj3" fmla="val 16885"/>
+            </a:avLst>
+          </a:prstGeom>
+          <a:solidFill>
+            <a:srgbClr val="FFC000"/>
+          </a:solidFill>
+          <a:ln>
+            <a:noFill/>
+          </a:ln>
+        </p:spPr>
+        <p:style>
+          <a:lnRef idx="2">
+            <a:schemeClr val="accent1">
+              <a:shade val="50000"/>
+            </a:schemeClr>
+          </a:lnRef>
+          <a:fillRef idx="1">
+            <a:schemeClr val="accent1"/>
+          </a:fillRef>
+          <a:effectRef idx="0">
+            <a:schemeClr val="accent1"/>
+          </a:effectRef>
+          <a:fontRef idx="minor">
+            <a:schemeClr val="lt1"/>
+          </a:fontRef>
+        </p:style>
+        <p:txBody>
+          <a:bodyPr rtlCol="0" anchor="ctr"/>
+          <a:lstStyle/>
+          <a:p>
+            <a:pPr algn="ctr"/>
+            <a:endParaRPr lang="en-PH">
+              <a:solidFill>
+                <a:schemeClr val="tx1"/>
+              </a:solidFill>
+            </a:endParaRPr>
+          </a:p>
+        </p:txBody>
+      </p:sp>
+      <p:grpSp>
+        <p:nvGrpSpPr>
+          <p:cNvPr id="9" name="Group 8">
+            <a:extLst>
+              <a:ext uri="{FF2B5EF4-FFF2-40B4-BE49-F238E27FC236}">
+                <a16:creationId xmlns:a16="http://schemas.microsoft.com/office/drawing/2014/main" id="{5A1C6EED-79F4-41C8-9539-6B52DEE8F3BE}"/>
+              </a:ext>
+            </a:extLst>
+          </p:cNvPr>
+          <p:cNvGrpSpPr/>
+          <p:nvPr/>
+        </p:nvGrpSpPr>
+        <p:grpSpPr>
+          <a:xfrm>
+            <a:off x="5197759" y="2544246"/>
+            <a:ext cx="2509108" cy="1159098"/>
+            <a:chOff x="5197759" y="2544246"/>
+            <a:chExt cx="2509108" cy="1159098"/>
+          </a:xfrm>
+          <a:solidFill>
+            <a:srgbClr val="FFC000"/>
+          </a:solidFill>
+        </p:grpSpPr>
+        <p:sp>
+          <p:nvSpPr>
+            <p:cNvPr id="27" name="Rectangle 26">
+              <a:extLst>
+                <a:ext uri="{FF2B5EF4-FFF2-40B4-BE49-F238E27FC236}">
+                  <a16:creationId xmlns:a16="http://schemas.microsoft.com/office/drawing/2014/main" id="{542453C8-E03B-4727-8FE8-31FF737CC39B}"/>
+                </a:ext>
+              </a:extLst>
+            </p:cNvPr>
+            <p:cNvSpPr/>
+            <p:nvPr/>
+          </p:nvSpPr>
+          <p:spPr>
+            <a:xfrm rot="5400000">
+              <a:off x="5551529" y="2361928"/>
+              <a:ext cx="324046" cy="1031585"/>
+            </a:xfrm>
+            <a:prstGeom prst="rect">
+              <a:avLst/>
+            </a:prstGeom>
+            <a:grpFill/>
+            <a:ln>
+              <a:noFill/>
+            </a:ln>
+          </p:spPr>
+          <p:style>
+            <a:lnRef idx="2">
+              <a:schemeClr val="accent1">
+                <a:shade val="50000"/>
+              </a:schemeClr>
+            </a:lnRef>
+            <a:fillRef idx="1">
+              <a:schemeClr val="accent1"/>
+            </a:fillRef>
+            <a:effectRef idx="0">
+              <a:schemeClr val="accent1"/>
+            </a:effectRef>
+            <a:fontRef idx="minor">
+              <a:schemeClr val="lt1"/>
+            </a:fontRef>
+          </p:style>
+          <p:txBody>
+            <a:bodyPr rtlCol="0" anchor="ctr"/>
+            <a:lstStyle/>
+            <a:p>
+              <a:pPr algn="ctr"/>
+              <a:endParaRPr lang="en-PH"/>
+            </a:p>
+          </p:txBody>
+        </p:sp>
+        <p:sp>
+          <p:nvSpPr>
+            <p:cNvPr id="28" name="Rectangle 27">
+              <a:extLst>
+                <a:ext uri="{FF2B5EF4-FFF2-40B4-BE49-F238E27FC236}">
+                  <a16:creationId xmlns:a16="http://schemas.microsoft.com/office/drawing/2014/main" id="{BF130348-5141-46BE-AD66-D005F481B5A9}"/>
+                </a:ext>
+              </a:extLst>
+            </p:cNvPr>
+            <p:cNvSpPr/>
+            <p:nvPr/>
+          </p:nvSpPr>
+          <p:spPr>
+            <a:xfrm rot="16200000">
+              <a:off x="7029052" y="2361927"/>
+              <a:ext cx="324046" cy="1031585"/>
+            </a:xfrm>
+            <a:prstGeom prst="rect">
+              <a:avLst/>
+            </a:prstGeom>
+            <a:grpFill/>
+            <a:ln>
+              <a:noFill/>
+            </a:ln>
+          </p:spPr>
+          <p:style>
+            <a:lnRef idx="2">
+              <a:schemeClr val="accent1">
+                <a:shade val="50000"/>
+              </a:schemeClr>
+            </a:lnRef>
+            <a:fillRef idx="1">
+              <a:schemeClr val="accent1"/>
+            </a:fillRef>
+            <a:effectRef idx="0">
+              <a:schemeClr val="accent1"/>
+            </a:effectRef>
+            <a:fontRef idx="minor">
+              <a:schemeClr val="lt1"/>
+            </a:fontRef>
+          </p:style>
+          <p:txBody>
+            <a:bodyPr rtlCol="0" anchor="ctr"/>
+            <a:lstStyle/>
+            <a:p>
+              <a:pPr algn="ctr"/>
+              <a:endParaRPr lang="en-PH"/>
+            </a:p>
+          </p:txBody>
+        </p:sp>
+        <p:sp>
+          <p:nvSpPr>
+            <p:cNvPr id="23" name="Freeform: Shape 22">
+              <a:extLst>
+                <a:ext uri="{FF2B5EF4-FFF2-40B4-BE49-F238E27FC236}">
+                  <a16:creationId xmlns:a16="http://schemas.microsoft.com/office/drawing/2014/main" id="{46917DC0-764B-4ABE-A2C4-162F50AEC92E}"/>
+                </a:ext>
+              </a:extLst>
+            </p:cNvPr>
+            <p:cNvSpPr/>
+            <p:nvPr/>
+          </p:nvSpPr>
+          <p:spPr>
+            <a:xfrm>
+              <a:off x="5872765" y="2544246"/>
+              <a:ext cx="1159098" cy="1159098"/>
+            </a:xfrm>
+            <a:custGeom>
+              <a:avLst/>
+              <a:gdLst>
+                <a:gd name="connsiteX0" fmla="*/ 579549 w 1159098"/>
+                <a:gd name="connsiteY0" fmla="*/ 356193 h 1159098"/>
+                <a:gd name="connsiteX1" fmla="*/ 356193 w 1159098"/>
+                <a:gd name="connsiteY1" fmla="*/ 579549 h 1159098"/>
+                <a:gd name="connsiteX2" fmla="*/ 579549 w 1159098"/>
+                <a:gd name="connsiteY2" fmla="*/ 802905 h 1159098"/>
+                <a:gd name="connsiteX3" fmla="*/ 802905 w 1159098"/>
+                <a:gd name="connsiteY3" fmla="*/ 579549 h 1159098"/>
+                <a:gd name="connsiteX4" fmla="*/ 579549 w 1159098"/>
+                <a:gd name="connsiteY4" fmla="*/ 356193 h 1159098"/>
+                <a:gd name="connsiteX5" fmla="*/ 579549 w 1159098"/>
+                <a:gd name="connsiteY5" fmla="*/ 0 h 1159098"/>
+                <a:gd name="connsiteX6" fmla="*/ 1159098 w 1159098"/>
+                <a:gd name="connsiteY6" fmla="*/ 579549 h 1159098"/>
+                <a:gd name="connsiteX7" fmla="*/ 579549 w 1159098"/>
+                <a:gd name="connsiteY7" fmla="*/ 1159098 h 1159098"/>
+                <a:gd name="connsiteX8" fmla="*/ 0 w 1159098"/>
+                <a:gd name="connsiteY8" fmla="*/ 579549 h 1159098"/>
+                <a:gd name="connsiteX9" fmla="*/ 579549 w 1159098"/>
+                <a:gd name="connsiteY9" fmla="*/ 0 h 1159098"/>
+              </a:gdLst>
+              <a:ahLst/>
+              <a:cxnLst>
+                <a:cxn ang="0">
+                  <a:pos x="connsiteX0" y="connsiteY0"/>
+                </a:cxn>
+                <a:cxn ang="0">
+                  <a:pos x="connsiteX1" y="connsiteY1"/>
+                </a:cxn>
+                <a:cxn ang="0">
+                  <a:pos x="connsiteX2" y="connsiteY2"/>
+                </a:cxn>
+                <a:cxn ang="0">
+                  <a:pos x="connsiteX3" y="connsiteY3"/>
+                </a:cxn>
+                <a:cxn ang="0">
+                  <a:pos x="connsiteX4" y="connsiteY4"/>
+                </a:cxn>
+                <a:cxn ang="0">
+                  <a:pos x="connsiteX5" y="connsiteY5"/>
+                </a:cxn>
+                <a:cxn ang="0">
+                  <a:pos x="connsiteX6" y="connsiteY6"/>
+                </a:cxn>
+                <a:cxn ang="0">
+                  <a:pos x="connsiteX7" y="connsiteY7"/>
+                </a:cxn>
+                <a:cxn ang="0">
+                  <a:pos x="connsiteX8" y="connsiteY8"/>
+                </a:cxn>
+                <a:cxn ang="0">
+                  <a:pos x="connsiteX9" y="connsiteY9"/>
+                </a:cxn>
+              </a:cxnLst>
+              <a:rect l="l" t="t" r="r" b="b"/>
+              <a:pathLst>
+                <a:path w="1159098" h="1159098">
+                  <a:moveTo>
+                    <a:pt x="579549" y="356193"/>
+                  </a:moveTo>
+                  <a:cubicBezTo>
+                    <a:pt x="456193" y="356193"/>
+                    <a:pt x="356193" y="456193"/>
+                    <a:pt x="356193" y="579549"/>
+                  </a:cubicBezTo>
+                  <a:cubicBezTo>
+                    <a:pt x="356193" y="702905"/>
+                    <a:pt x="456193" y="802905"/>
+                    <a:pt x="579549" y="802905"/>
+                  </a:cubicBezTo>
+                  <a:cubicBezTo>
+                    <a:pt x="702905" y="802905"/>
+                    <a:pt x="802905" y="702905"/>
+                    <a:pt x="802905" y="579549"/>
+                  </a:cubicBezTo>
+                  <a:cubicBezTo>
+                    <a:pt x="802905" y="456193"/>
+                    <a:pt x="702905" y="356193"/>
+                    <a:pt x="579549" y="356193"/>
+                  </a:cubicBezTo>
+                  <a:close/>
+                  <a:moveTo>
+                    <a:pt x="579549" y="0"/>
+                  </a:moveTo>
+                  <a:cubicBezTo>
+                    <a:pt x="899625" y="0"/>
+                    <a:pt x="1159098" y="259473"/>
+                    <a:pt x="1159098" y="579549"/>
+                  </a:cubicBezTo>
+                  <a:cubicBezTo>
+                    <a:pt x="1159098" y="899625"/>
+                    <a:pt x="899625" y="1159098"/>
+                    <a:pt x="579549" y="1159098"/>
+                  </a:cubicBezTo>
+                  <a:cubicBezTo>
+                    <a:pt x="259473" y="1159098"/>
+                    <a:pt x="0" y="899625"/>
+                    <a:pt x="0" y="579549"/>
+                  </a:cubicBezTo>
+                  <a:cubicBezTo>
+                    <a:pt x="0" y="259473"/>
+                    <a:pt x="259473" y="0"/>
+                    <a:pt x="579549" y="0"/>
+                  </a:cubicBezTo>
+                  <a:close/>
+                </a:path>
+              </a:pathLst>
+            </a:custGeom>
+            <a:grpFill/>
+            <a:ln>
+              <a:noFill/>
+            </a:ln>
+          </p:spPr>
+          <p:style>
+            <a:lnRef idx="2">
+              <a:schemeClr val="accent1">
+                <a:shade val="50000"/>
+              </a:schemeClr>
+            </a:lnRef>
+            <a:fillRef idx="1">
+              <a:schemeClr val="accent1"/>
+            </a:fillRef>
+            <a:effectRef idx="0">
+              <a:schemeClr val="accent1"/>
+            </a:effectRef>
+            <a:fontRef idx="minor">
+              <a:schemeClr val="lt1"/>
+            </a:fontRef>
+          </p:style>
+          <p:txBody>
+            <a:bodyPr rtlCol="0" anchor="ctr"/>
+            <a:lstStyle/>
+            <a:p>
+              <a:pPr algn="ctr"/>
+              <a:endParaRPr lang="en-PH"/>
+            </a:p>
+          </p:txBody>
+        </p:sp>
+      </p:grpSp>
+      <p:sp>
+        <p:nvSpPr>
+          <p:cNvPr id="29" name="Rectangle 28">
+            <a:extLst>
+              <a:ext uri="{FF2B5EF4-FFF2-40B4-BE49-F238E27FC236}">
+                <a16:creationId xmlns:a16="http://schemas.microsoft.com/office/drawing/2014/main" id="{53CA77C3-478C-47E0-87A0-2917BA112F62}"/>
+              </a:ext>
+            </a:extLst>
+          </p:cNvPr>
+          <p:cNvSpPr/>
+          <p:nvPr/>
+        </p:nvSpPr>
+        <p:spPr>
+          <a:xfrm>
+            <a:off x="7087744" y="4287349"/>
+            <a:ext cx="324046" cy="1031585"/>
+          </a:xfrm>
+          <a:prstGeom prst="rect">
+            <a:avLst/>
+          </a:prstGeom>
+          <a:solidFill>
+            <a:srgbClr val="FFC000"/>
+          </a:solidFill>
+          <a:ln>
+            <a:noFill/>
+          </a:ln>
+        </p:spPr>
+        <p:style>
+          <a:lnRef idx="2">
+            <a:schemeClr val="accent1">
+              <a:shade val="50000"/>
+            </a:schemeClr>
+          </a:lnRef>
+          <a:fillRef idx="1">
+            <a:schemeClr val="accent1"/>
+          </a:fillRef>
+          <a:effectRef idx="0">
+            <a:schemeClr val="accent1"/>
+          </a:effectRef>
+          <a:fontRef idx="minor">
+            <a:schemeClr val="lt1"/>
+          </a:fontRef>
+        </p:style>
+        <p:txBody>
+          <a:bodyPr rtlCol="0" anchor="ctr"/>
+          <a:lstStyle/>
+          <a:p>
+            <a:pPr algn="ctr"/>
+            <a:endParaRPr lang="en-PH"/>
+          </a:p>
+        </p:txBody>
+      </p:sp>
+      <p:sp>
+        <p:nvSpPr>
+          <p:cNvPr id="30" name="Rectangle 29">
+            <a:extLst>
+              <a:ext uri="{FF2B5EF4-FFF2-40B4-BE49-F238E27FC236}">
+                <a16:creationId xmlns:a16="http://schemas.microsoft.com/office/drawing/2014/main" id="{88302F38-475E-46E8-B26F-AACBDFA718B7}"/>
+              </a:ext>
+            </a:extLst>
+          </p:cNvPr>
+          <p:cNvSpPr/>
+          <p:nvPr/>
+        </p:nvSpPr>
+        <p:spPr>
+          <a:xfrm>
+            <a:off x="5492838" y="4292111"/>
+            <a:ext cx="324046" cy="1031585"/>
+          </a:xfrm>
+          <a:prstGeom prst="rect">
+            <a:avLst/>
+          </a:prstGeom>
+          <a:solidFill>
+            <a:srgbClr val="FFC000"/>
+          </a:solidFill>
+          <a:ln>
+            <a:noFill/>
+          </a:ln>
+        </p:spPr>
+        <p:style>
+          <a:lnRef idx="2">
+            <a:schemeClr val="accent1">
+              <a:shade val="50000"/>
+            </a:schemeClr>
+          </a:lnRef>
+          <a:fillRef idx="1">
+            <a:schemeClr val="accent1"/>
+          </a:fillRef>
+          <a:effectRef idx="0">
+            <a:schemeClr val="accent1"/>
+          </a:effectRef>
+          <a:fontRef idx="minor">
+            <a:schemeClr val="lt1"/>
+          </a:fontRef>
+        </p:style>
+        <p:txBody>
+          <a:bodyPr rtlCol="0" anchor="ctr"/>
+          <a:lstStyle/>
+          <a:p>
+            <a:pPr algn="ctr"/>
+            <a:endParaRPr lang="en-PH"/>
+          </a:p>
+        </p:txBody>
+      </p:sp>
+      <p:sp>
+        <p:nvSpPr>
+          <p:cNvPr id="31" name="Rectangle 30">
+            <a:extLst>
+              <a:ext uri="{FF2B5EF4-FFF2-40B4-BE49-F238E27FC236}">
+                <a16:creationId xmlns:a16="http://schemas.microsoft.com/office/drawing/2014/main" id="{2A4A4D1E-9C05-42F0-8C66-EE8ABDDD26F3}"/>
+              </a:ext>
+            </a:extLst>
+          </p:cNvPr>
+          <p:cNvSpPr/>
+          <p:nvPr/>
+        </p:nvSpPr>
+        <p:spPr>
+          <a:xfrm>
+            <a:off x="6290291" y="4191243"/>
+            <a:ext cx="324046" cy="1031585"/>
+          </a:xfrm>
+          <a:prstGeom prst="rect">
+            <a:avLst/>
+          </a:prstGeom>
+          <a:solidFill>
+            <a:srgbClr val="FFC000"/>
+          </a:solidFill>
+          <a:ln>
+            <a:noFill/>
+          </a:ln>
+        </p:spPr>
+        <p:style>
+          <a:lnRef idx="2">
+            <a:schemeClr val="accent1">
+              <a:shade val="50000"/>
+            </a:schemeClr>
+          </a:lnRef>
+          <a:fillRef idx="1">
+            <a:schemeClr val="accent1"/>
+          </a:fillRef>
+          <a:effectRef idx="0">
+            <a:schemeClr val="accent1"/>
+          </a:effectRef>
+          <a:fontRef idx="minor">
+            <a:schemeClr val="lt1"/>
+          </a:fontRef>
+        </p:style>
+        <p:txBody>
+          <a:bodyPr rtlCol="0" anchor="ctr"/>
+          <a:lstStyle/>
+          <a:p>
+            <a:pPr algn="ctr"/>
+            <a:endParaRPr lang="en-PH"/>
+          </a:p>
+        </p:txBody>
+      </p:sp>
     </p:spTree>
     <p:extLst>
       <p:ext uri="{BB962C8B-B14F-4D97-AF65-F5344CB8AC3E}">
         <p14:creationId xmlns:p14="http://schemas.microsoft.com/office/powerpoint/2010/main" val="1130468912"/>
+      </p:ext>
+    </p:extLst>
+  </p:cSld>
+  <p:clrMapOvr>
+    <a:masterClrMapping/>
+  </p:clrMapOvr>
+</p:sld>
+</file>
+
+<file path=ppt/slides/slide3.xml><?xml version="1.0" encoding="utf-8"?>
+<p:sld xmlns:a="http://schemas.openxmlformats.org/drawingml/2006/main" xmlns:r="http://schemas.openxmlformats.org/officeDocument/2006/relationships" xmlns:p="http://schemas.openxmlformats.org/presentationml/2006/main">
+  <p:cSld>
+    <p:spTree>
+      <p:nvGrpSpPr>
+        <p:cNvPr id="1" name=""/>
+        <p:cNvGrpSpPr/>
+        <p:nvPr/>
+      </p:nvGrpSpPr>
+      <p:grpSpPr>
+        <a:xfrm>
+          <a:off x="0" y="0"/>
+          <a:ext cx="0" cy="0"/>
+          <a:chOff x="0" y="0"/>
+          <a:chExt cx="0" cy="0"/>
+        </a:xfrm>
+      </p:grpSpPr>
+      <p:grpSp>
+        <p:nvGrpSpPr>
+          <p:cNvPr id="15" name="Group 14">
+            <a:extLst>
+              <a:ext uri="{FF2B5EF4-FFF2-40B4-BE49-F238E27FC236}">
+                <a16:creationId xmlns:a16="http://schemas.microsoft.com/office/drawing/2014/main" id="{BC76D56A-5D74-49D5-9871-59F66D773DBF}"/>
+              </a:ext>
+            </a:extLst>
+          </p:cNvPr>
+          <p:cNvGrpSpPr/>
+          <p:nvPr/>
+        </p:nvGrpSpPr>
+        <p:grpSpPr>
+          <a:xfrm>
+            <a:off x="2154717" y="1057747"/>
+            <a:ext cx="3187700" cy="3187700"/>
+            <a:chOff x="4284885" y="1676400"/>
+            <a:chExt cx="3187700" cy="3187700"/>
+          </a:xfrm>
+        </p:grpSpPr>
+        <p:sp>
+          <p:nvSpPr>
+            <p:cNvPr id="14" name="Rectangle: Rounded Corners 13">
+              <a:extLst>
+                <a:ext uri="{FF2B5EF4-FFF2-40B4-BE49-F238E27FC236}">
+                  <a16:creationId xmlns:a16="http://schemas.microsoft.com/office/drawing/2014/main" id="{915DC022-7BA1-4685-ABDD-604C25F89920}"/>
+                </a:ext>
+              </a:extLst>
+            </p:cNvPr>
+            <p:cNvSpPr/>
+            <p:nvPr/>
+          </p:nvSpPr>
+          <p:spPr>
+            <a:xfrm>
+              <a:off x="4284885" y="1676400"/>
+              <a:ext cx="3187700" cy="3187700"/>
+            </a:xfrm>
+            <a:prstGeom prst="roundRect">
+              <a:avLst/>
+            </a:prstGeom>
+            <a:solidFill>
+              <a:schemeClr val="bg1"/>
+            </a:solidFill>
+            <a:ln>
+              <a:noFill/>
+            </a:ln>
+          </p:spPr>
+          <p:style>
+            <a:lnRef idx="2">
+              <a:schemeClr val="accent1">
+                <a:shade val="50000"/>
+              </a:schemeClr>
+            </a:lnRef>
+            <a:fillRef idx="1">
+              <a:schemeClr val="accent1"/>
+            </a:fillRef>
+            <a:effectRef idx="0">
+              <a:schemeClr val="accent1"/>
+            </a:effectRef>
+            <a:fontRef idx="minor">
+              <a:schemeClr val="lt1"/>
+            </a:fontRef>
+          </p:style>
+          <p:txBody>
+            <a:bodyPr rtlCol="0" anchor="ctr"/>
+            <a:lstStyle/>
+            <a:p>
+              <a:pPr algn="ctr"/>
+              <a:endParaRPr lang="en-PH"/>
+            </a:p>
+          </p:txBody>
+        </p:sp>
+        <p:grpSp>
+          <p:nvGrpSpPr>
+            <p:cNvPr id="12" name="Group 11">
+              <a:extLst>
+                <a:ext uri="{FF2B5EF4-FFF2-40B4-BE49-F238E27FC236}">
+                  <a16:creationId xmlns:a16="http://schemas.microsoft.com/office/drawing/2014/main" id="{4A1ADF41-ABCB-443C-A40A-3A5CF31CE0AA}"/>
+                </a:ext>
+              </a:extLst>
+            </p:cNvPr>
+            <p:cNvGrpSpPr/>
+            <p:nvPr/>
+          </p:nvGrpSpPr>
+          <p:grpSpPr>
+            <a:xfrm>
+              <a:off x="4624182" y="1940880"/>
+              <a:ext cx="2509106" cy="2649215"/>
+              <a:chOff x="3807110" y="2057430"/>
+              <a:chExt cx="2509106" cy="2649215"/>
+            </a:xfrm>
+            <a:solidFill>
+              <a:srgbClr val="FF9F11"/>
+            </a:solidFill>
+          </p:grpSpPr>
+          <p:sp>
+            <p:nvSpPr>
+              <p:cNvPr id="4" name="Block Arc 3">
+                <a:extLst>
+                  <a:ext uri="{FF2B5EF4-FFF2-40B4-BE49-F238E27FC236}">
+                    <a16:creationId xmlns:a16="http://schemas.microsoft.com/office/drawing/2014/main" id="{F543C352-6883-44BF-B507-21936A304FCD}"/>
+                  </a:ext>
+                </a:extLst>
+              </p:cNvPr>
+              <p:cNvSpPr/>
+              <p:nvPr/>
+            </p:nvSpPr>
+            <p:spPr>
+              <a:xfrm>
+                <a:off x="4261400" y="2787693"/>
+                <a:ext cx="1539025" cy="1918952"/>
+              </a:xfrm>
+              <a:prstGeom prst="blockArc">
+                <a:avLst>
+                  <a:gd name="adj1" fmla="val 10800000"/>
+                  <a:gd name="adj2" fmla="val 21361144"/>
+                  <a:gd name="adj3" fmla="val 21000"/>
+                </a:avLst>
+              </a:prstGeom>
+              <a:grpFill/>
+              <a:ln>
+                <a:noFill/>
+              </a:ln>
+            </p:spPr>
+            <p:style>
+              <a:lnRef idx="2">
+                <a:schemeClr val="accent1">
+                  <a:shade val="50000"/>
+                </a:schemeClr>
+              </a:lnRef>
+              <a:fillRef idx="1">
+                <a:schemeClr val="accent1"/>
+              </a:fillRef>
+              <a:effectRef idx="0">
+                <a:schemeClr val="accent1"/>
+              </a:effectRef>
+              <a:fontRef idx="minor">
+                <a:schemeClr val="lt1"/>
+              </a:fontRef>
+            </p:style>
+            <p:txBody>
+              <a:bodyPr rtlCol="0" anchor="ctr"/>
+              <a:lstStyle/>
+              <a:p>
+                <a:pPr algn="ctr"/>
+                <a:endParaRPr lang="en-PH">
+                  <a:solidFill>
+                    <a:schemeClr val="tx1"/>
+                  </a:solidFill>
+                </a:endParaRPr>
+              </a:p>
+            </p:txBody>
+          </p:sp>
+          <p:grpSp>
+            <p:nvGrpSpPr>
+              <p:cNvPr id="5" name="Group 4">
+                <a:extLst>
+                  <a:ext uri="{FF2B5EF4-FFF2-40B4-BE49-F238E27FC236}">
+                    <a16:creationId xmlns:a16="http://schemas.microsoft.com/office/drawing/2014/main" id="{D77957B8-B02F-467D-AF06-AD2E72155F84}"/>
+                  </a:ext>
+                </a:extLst>
+              </p:cNvPr>
+              <p:cNvGrpSpPr/>
+              <p:nvPr/>
+            </p:nvGrpSpPr>
+            <p:grpSpPr>
+              <a:xfrm>
+                <a:off x="3807110" y="2057430"/>
+                <a:ext cx="2509106" cy="1053414"/>
+                <a:chOff x="5197760" y="2642265"/>
+                <a:chExt cx="2509106" cy="1053414"/>
+              </a:xfrm>
+              <a:grpFill/>
+            </p:grpSpPr>
+            <p:sp>
+              <p:nvSpPr>
+                <p:cNvPr id="6" name="Rectangle 5">
+                  <a:extLst>
+                    <a:ext uri="{FF2B5EF4-FFF2-40B4-BE49-F238E27FC236}">
+                      <a16:creationId xmlns:a16="http://schemas.microsoft.com/office/drawing/2014/main" id="{BDC30EBA-EB9B-4C4B-A7DF-085A15D145E6}"/>
+                    </a:ext>
+                  </a:extLst>
+                </p:cNvPr>
+                <p:cNvSpPr/>
+                <p:nvPr/>
+              </p:nvSpPr>
+              <p:spPr>
+                <a:xfrm rot="5400000">
+                  <a:off x="5566259" y="2422888"/>
+                  <a:ext cx="294587" cy="1031585"/>
+                </a:xfrm>
+                <a:prstGeom prst="rect">
+                  <a:avLst/>
+                </a:prstGeom>
+                <a:grpFill/>
+                <a:ln>
+                  <a:noFill/>
+                </a:ln>
+              </p:spPr>
+              <p:style>
+                <a:lnRef idx="2">
+                  <a:schemeClr val="accent1">
+                    <a:shade val="50000"/>
+                  </a:schemeClr>
+                </a:lnRef>
+                <a:fillRef idx="1">
+                  <a:schemeClr val="accent1"/>
+                </a:fillRef>
+                <a:effectRef idx="0">
+                  <a:schemeClr val="accent1"/>
+                </a:effectRef>
+                <a:fontRef idx="minor">
+                  <a:schemeClr val="lt1"/>
+                </a:fontRef>
+              </p:style>
+              <p:txBody>
+                <a:bodyPr rtlCol="0" anchor="ctr"/>
+                <a:lstStyle/>
+                <a:p>
+                  <a:pPr algn="ctr"/>
+                  <a:endParaRPr lang="en-PH"/>
+                </a:p>
+              </p:txBody>
+            </p:sp>
+            <p:sp>
+              <p:nvSpPr>
+                <p:cNvPr id="7" name="Rectangle 6">
+                  <a:extLst>
+                    <a:ext uri="{FF2B5EF4-FFF2-40B4-BE49-F238E27FC236}">
+                      <a16:creationId xmlns:a16="http://schemas.microsoft.com/office/drawing/2014/main" id="{F2098356-BC05-48D2-8EE5-338B429536E3}"/>
+                    </a:ext>
+                  </a:extLst>
+                </p:cNvPr>
+                <p:cNvSpPr/>
+                <p:nvPr/>
+              </p:nvSpPr>
+              <p:spPr>
+                <a:xfrm rot="16200000">
+                  <a:off x="7043780" y="2422887"/>
+                  <a:ext cx="294587" cy="1031585"/>
+                </a:xfrm>
+                <a:prstGeom prst="rect">
+                  <a:avLst/>
+                </a:prstGeom>
+                <a:grpFill/>
+                <a:ln>
+                  <a:noFill/>
+                </a:ln>
+              </p:spPr>
+              <p:style>
+                <a:lnRef idx="2">
+                  <a:schemeClr val="accent1">
+                    <a:shade val="50000"/>
+                  </a:schemeClr>
+                </a:lnRef>
+                <a:fillRef idx="1">
+                  <a:schemeClr val="accent1"/>
+                </a:fillRef>
+                <a:effectRef idx="0">
+                  <a:schemeClr val="accent1"/>
+                </a:effectRef>
+                <a:fontRef idx="minor">
+                  <a:schemeClr val="lt1"/>
+                </a:fontRef>
+              </p:style>
+              <p:txBody>
+                <a:bodyPr rtlCol="0" anchor="ctr"/>
+                <a:lstStyle/>
+                <a:p>
+                  <a:pPr algn="ctr"/>
+                  <a:endParaRPr lang="en-PH"/>
+                </a:p>
+              </p:txBody>
+            </p:sp>
+            <p:sp>
+              <p:nvSpPr>
+                <p:cNvPr id="8" name="Freeform: Shape 7">
+                  <a:extLst>
+                    <a:ext uri="{FF2B5EF4-FFF2-40B4-BE49-F238E27FC236}">
+                      <a16:creationId xmlns:a16="http://schemas.microsoft.com/office/drawing/2014/main" id="{403A326B-9427-49FF-9026-78C84C1BCA7A}"/>
+                    </a:ext>
+                  </a:extLst>
+                </p:cNvPr>
+                <p:cNvSpPr/>
+                <p:nvPr/>
+              </p:nvSpPr>
+              <p:spPr>
+                <a:xfrm>
+                  <a:off x="5894855" y="2642265"/>
+                  <a:ext cx="1053414" cy="1053414"/>
+                </a:xfrm>
+                <a:custGeom>
+                  <a:avLst/>
+                  <a:gdLst>
+                    <a:gd name="connsiteX0" fmla="*/ 579549 w 1159098"/>
+                    <a:gd name="connsiteY0" fmla="*/ 356193 h 1159098"/>
+                    <a:gd name="connsiteX1" fmla="*/ 356193 w 1159098"/>
+                    <a:gd name="connsiteY1" fmla="*/ 579549 h 1159098"/>
+                    <a:gd name="connsiteX2" fmla="*/ 579549 w 1159098"/>
+                    <a:gd name="connsiteY2" fmla="*/ 802905 h 1159098"/>
+                    <a:gd name="connsiteX3" fmla="*/ 802905 w 1159098"/>
+                    <a:gd name="connsiteY3" fmla="*/ 579549 h 1159098"/>
+                    <a:gd name="connsiteX4" fmla="*/ 579549 w 1159098"/>
+                    <a:gd name="connsiteY4" fmla="*/ 356193 h 1159098"/>
+                    <a:gd name="connsiteX5" fmla="*/ 579549 w 1159098"/>
+                    <a:gd name="connsiteY5" fmla="*/ 0 h 1159098"/>
+                    <a:gd name="connsiteX6" fmla="*/ 1159098 w 1159098"/>
+                    <a:gd name="connsiteY6" fmla="*/ 579549 h 1159098"/>
+                    <a:gd name="connsiteX7" fmla="*/ 579549 w 1159098"/>
+                    <a:gd name="connsiteY7" fmla="*/ 1159098 h 1159098"/>
+                    <a:gd name="connsiteX8" fmla="*/ 0 w 1159098"/>
+                    <a:gd name="connsiteY8" fmla="*/ 579549 h 1159098"/>
+                    <a:gd name="connsiteX9" fmla="*/ 579549 w 1159098"/>
+                    <a:gd name="connsiteY9" fmla="*/ 0 h 1159098"/>
+                  </a:gdLst>
+                  <a:ahLst/>
+                  <a:cxnLst>
+                    <a:cxn ang="0">
+                      <a:pos x="connsiteX0" y="connsiteY0"/>
+                    </a:cxn>
+                    <a:cxn ang="0">
+                      <a:pos x="connsiteX1" y="connsiteY1"/>
+                    </a:cxn>
+                    <a:cxn ang="0">
+                      <a:pos x="connsiteX2" y="connsiteY2"/>
+                    </a:cxn>
+                    <a:cxn ang="0">
+                      <a:pos x="connsiteX3" y="connsiteY3"/>
+                    </a:cxn>
+                    <a:cxn ang="0">
+                      <a:pos x="connsiteX4" y="connsiteY4"/>
+                    </a:cxn>
+                    <a:cxn ang="0">
+                      <a:pos x="connsiteX5" y="connsiteY5"/>
+                    </a:cxn>
+                    <a:cxn ang="0">
+                      <a:pos x="connsiteX6" y="connsiteY6"/>
+                    </a:cxn>
+                    <a:cxn ang="0">
+                      <a:pos x="connsiteX7" y="connsiteY7"/>
+                    </a:cxn>
+                    <a:cxn ang="0">
+                      <a:pos x="connsiteX8" y="connsiteY8"/>
+                    </a:cxn>
+                    <a:cxn ang="0">
+                      <a:pos x="connsiteX9" y="connsiteY9"/>
+                    </a:cxn>
+                  </a:cxnLst>
+                  <a:rect l="l" t="t" r="r" b="b"/>
+                  <a:pathLst>
+                    <a:path w="1159098" h="1159098">
+                      <a:moveTo>
+                        <a:pt x="579549" y="356193"/>
+                      </a:moveTo>
+                      <a:cubicBezTo>
+                        <a:pt x="456193" y="356193"/>
+                        <a:pt x="356193" y="456193"/>
+                        <a:pt x="356193" y="579549"/>
+                      </a:cubicBezTo>
+                      <a:cubicBezTo>
+                        <a:pt x="356193" y="702905"/>
+                        <a:pt x="456193" y="802905"/>
+                        <a:pt x="579549" y="802905"/>
+                      </a:cubicBezTo>
+                      <a:cubicBezTo>
+                        <a:pt x="702905" y="802905"/>
+                        <a:pt x="802905" y="702905"/>
+                        <a:pt x="802905" y="579549"/>
+                      </a:cubicBezTo>
+                      <a:cubicBezTo>
+                        <a:pt x="802905" y="456193"/>
+                        <a:pt x="702905" y="356193"/>
+                        <a:pt x="579549" y="356193"/>
+                      </a:cubicBezTo>
+                      <a:close/>
+                      <a:moveTo>
+                        <a:pt x="579549" y="0"/>
+                      </a:moveTo>
+                      <a:cubicBezTo>
+                        <a:pt x="899625" y="0"/>
+                        <a:pt x="1159098" y="259473"/>
+                        <a:pt x="1159098" y="579549"/>
+                      </a:cubicBezTo>
+                      <a:cubicBezTo>
+                        <a:pt x="1159098" y="899625"/>
+                        <a:pt x="899625" y="1159098"/>
+                        <a:pt x="579549" y="1159098"/>
+                      </a:cubicBezTo>
+                      <a:cubicBezTo>
+                        <a:pt x="259473" y="1159098"/>
+                        <a:pt x="0" y="899625"/>
+                        <a:pt x="0" y="579549"/>
+                      </a:cubicBezTo>
+                      <a:cubicBezTo>
+                        <a:pt x="0" y="259473"/>
+                        <a:pt x="259473" y="0"/>
+                        <a:pt x="579549" y="0"/>
+                      </a:cubicBezTo>
+                      <a:close/>
+                    </a:path>
+                  </a:pathLst>
+                </a:custGeom>
+                <a:grpFill/>
+                <a:ln>
+                  <a:noFill/>
+                </a:ln>
+              </p:spPr>
+              <p:style>
+                <a:lnRef idx="2">
+                  <a:schemeClr val="accent1">
+                    <a:shade val="50000"/>
+                  </a:schemeClr>
+                </a:lnRef>
+                <a:fillRef idx="1">
+                  <a:schemeClr val="accent1"/>
+                </a:fillRef>
+                <a:effectRef idx="0">
+                  <a:schemeClr val="accent1"/>
+                </a:effectRef>
+                <a:fontRef idx="minor">
+                  <a:schemeClr val="lt1"/>
+                </a:fontRef>
+              </p:style>
+              <p:txBody>
+                <a:bodyPr rtlCol="0" anchor="ctr"/>
+                <a:lstStyle/>
+                <a:p>
+                  <a:pPr algn="ctr"/>
+                  <a:endParaRPr lang="en-PH"/>
+                </a:p>
+              </p:txBody>
+            </p:sp>
+          </p:grpSp>
+          <p:sp>
+            <p:nvSpPr>
+              <p:cNvPr id="9" name="Rectangle 8">
+                <a:extLst>
+                  <a:ext uri="{FF2B5EF4-FFF2-40B4-BE49-F238E27FC236}">
+                    <a16:creationId xmlns:a16="http://schemas.microsoft.com/office/drawing/2014/main" id="{4869035E-99D6-46CD-9402-A33D66E9AED7}"/>
+                  </a:ext>
+                </a:extLst>
+              </p:cNvPr>
+              <p:cNvSpPr/>
+              <p:nvPr/>
+            </p:nvSpPr>
+            <p:spPr>
+              <a:xfrm>
+                <a:off x="5476379" y="3673495"/>
+                <a:ext cx="324046" cy="656126"/>
+              </a:xfrm>
+              <a:prstGeom prst="rect">
+                <a:avLst/>
+              </a:prstGeom>
+              <a:grpFill/>
+              <a:ln>
+                <a:noFill/>
+              </a:ln>
+            </p:spPr>
+            <p:style>
+              <a:lnRef idx="2">
+                <a:schemeClr val="accent1">
+                  <a:shade val="50000"/>
+                </a:schemeClr>
+              </a:lnRef>
+              <a:fillRef idx="1">
+                <a:schemeClr val="accent1"/>
+              </a:fillRef>
+              <a:effectRef idx="0">
+                <a:schemeClr val="accent1"/>
+              </a:effectRef>
+              <a:fontRef idx="minor">
+                <a:schemeClr val="lt1"/>
+              </a:fontRef>
+            </p:style>
+            <p:txBody>
+              <a:bodyPr rtlCol="0" anchor="ctr"/>
+              <a:lstStyle/>
+              <a:p>
+                <a:pPr algn="ctr"/>
+                <a:endParaRPr lang="en-PH"/>
+              </a:p>
+            </p:txBody>
+          </p:sp>
+          <p:sp>
+            <p:nvSpPr>
+              <p:cNvPr id="10" name="Rectangle 9">
+                <a:extLst>
+                  <a:ext uri="{FF2B5EF4-FFF2-40B4-BE49-F238E27FC236}">
+                    <a16:creationId xmlns:a16="http://schemas.microsoft.com/office/drawing/2014/main" id="{7820EA54-8DBA-4364-8E39-BF3E4DAFEB28}"/>
+                  </a:ext>
+                </a:extLst>
+              </p:cNvPr>
+              <p:cNvSpPr/>
+              <p:nvPr/>
+            </p:nvSpPr>
+            <p:spPr>
+              <a:xfrm>
+                <a:off x="4261400" y="3744787"/>
+                <a:ext cx="324046" cy="584833"/>
+              </a:xfrm>
+              <a:prstGeom prst="rect">
+                <a:avLst/>
+              </a:prstGeom>
+              <a:grpFill/>
+              <a:ln>
+                <a:noFill/>
+              </a:ln>
+            </p:spPr>
+            <p:style>
+              <a:lnRef idx="2">
+                <a:schemeClr val="accent1">
+                  <a:shade val="50000"/>
+                </a:schemeClr>
+              </a:lnRef>
+              <a:fillRef idx="1">
+                <a:schemeClr val="accent1"/>
+              </a:fillRef>
+              <a:effectRef idx="0">
+                <a:schemeClr val="accent1"/>
+              </a:effectRef>
+              <a:fontRef idx="minor">
+                <a:schemeClr val="lt1"/>
+              </a:fontRef>
+            </p:style>
+            <p:txBody>
+              <a:bodyPr rtlCol="0" anchor="ctr"/>
+              <a:lstStyle/>
+              <a:p>
+                <a:pPr algn="ctr"/>
+                <a:endParaRPr lang="en-PH"/>
+              </a:p>
+            </p:txBody>
+          </p:sp>
+          <p:sp>
+            <p:nvSpPr>
+              <p:cNvPr id="11" name="Rectangle 10">
+                <a:extLst>
+                  <a:ext uri="{FF2B5EF4-FFF2-40B4-BE49-F238E27FC236}">
+                    <a16:creationId xmlns:a16="http://schemas.microsoft.com/office/drawing/2014/main" id="{A72BDB1C-D4DE-421D-B9DF-5D89BD2677C1}"/>
+                  </a:ext>
+                </a:extLst>
+              </p:cNvPr>
+              <p:cNvSpPr/>
+              <p:nvPr/>
+            </p:nvSpPr>
+            <p:spPr>
+              <a:xfrm>
+                <a:off x="4868889" y="3744787"/>
+                <a:ext cx="324046" cy="961858"/>
+              </a:xfrm>
+              <a:prstGeom prst="rect">
+                <a:avLst/>
+              </a:prstGeom>
+              <a:grpFill/>
+              <a:ln>
+                <a:noFill/>
+              </a:ln>
+            </p:spPr>
+            <p:style>
+              <a:lnRef idx="2">
+                <a:schemeClr val="accent1">
+                  <a:shade val="50000"/>
+                </a:schemeClr>
+              </a:lnRef>
+              <a:fillRef idx="1">
+                <a:schemeClr val="accent1"/>
+              </a:fillRef>
+              <a:effectRef idx="0">
+                <a:schemeClr val="accent1"/>
+              </a:effectRef>
+              <a:fontRef idx="minor">
+                <a:schemeClr val="lt1"/>
+              </a:fontRef>
+            </p:style>
+            <p:txBody>
+              <a:bodyPr rtlCol="0" anchor="ctr"/>
+              <a:lstStyle/>
+              <a:p>
+                <a:pPr algn="ctr"/>
+                <a:endParaRPr lang="en-PH"/>
+              </a:p>
+            </p:txBody>
+          </p:sp>
+        </p:grpSp>
+      </p:grpSp>
+      <p:grpSp>
+        <p:nvGrpSpPr>
+          <p:cNvPr id="13" name="Group 12">
+            <a:extLst>
+              <a:ext uri="{FF2B5EF4-FFF2-40B4-BE49-F238E27FC236}">
+                <a16:creationId xmlns:a16="http://schemas.microsoft.com/office/drawing/2014/main" id="{3CB26F4B-1D1C-4164-9BC9-641087D095A2}"/>
+              </a:ext>
+            </a:extLst>
+          </p:cNvPr>
+          <p:cNvGrpSpPr/>
+          <p:nvPr/>
+        </p:nvGrpSpPr>
+        <p:grpSpPr>
+          <a:xfrm>
+            <a:off x="5894053" y="1057747"/>
+            <a:ext cx="3187700" cy="3187700"/>
+            <a:chOff x="4284885" y="1676400"/>
+            <a:chExt cx="3187700" cy="3187700"/>
+          </a:xfrm>
+        </p:grpSpPr>
+        <p:sp>
+          <p:nvSpPr>
+            <p:cNvPr id="16" name="Rectangle: Rounded Corners 15">
+              <a:extLst>
+                <a:ext uri="{FF2B5EF4-FFF2-40B4-BE49-F238E27FC236}">
+                  <a16:creationId xmlns:a16="http://schemas.microsoft.com/office/drawing/2014/main" id="{E73029FB-C586-4EA8-B746-5AC991DC3847}"/>
+                </a:ext>
+              </a:extLst>
+            </p:cNvPr>
+            <p:cNvSpPr/>
+            <p:nvPr/>
+          </p:nvSpPr>
+          <p:spPr>
+            <a:xfrm>
+              <a:off x="4284885" y="1676400"/>
+              <a:ext cx="3187700" cy="3187700"/>
+            </a:xfrm>
+            <a:prstGeom prst="roundRect">
+              <a:avLst/>
+            </a:prstGeom>
+            <a:solidFill>
+              <a:schemeClr val="bg1"/>
+            </a:solidFill>
+            <a:ln>
+              <a:noFill/>
+            </a:ln>
+          </p:spPr>
+          <p:style>
+            <a:lnRef idx="2">
+              <a:schemeClr val="accent1">
+                <a:shade val="50000"/>
+              </a:schemeClr>
+            </a:lnRef>
+            <a:fillRef idx="1">
+              <a:schemeClr val="accent1"/>
+            </a:fillRef>
+            <a:effectRef idx="0">
+              <a:schemeClr val="accent1"/>
+            </a:effectRef>
+            <a:fontRef idx="minor">
+              <a:schemeClr val="lt1"/>
+            </a:fontRef>
+          </p:style>
+          <p:txBody>
+            <a:bodyPr rtlCol="0" anchor="ctr"/>
+            <a:lstStyle/>
+            <a:p>
+              <a:pPr algn="ctr"/>
+              <a:endParaRPr lang="en-PH"/>
+            </a:p>
+          </p:txBody>
+        </p:sp>
+        <p:grpSp>
+          <p:nvGrpSpPr>
+            <p:cNvPr id="17" name="Group 16">
+              <a:extLst>
+                <a:ext uri="{FF2B5EF4-FFF2-40B4-BE49-F238E27FC236}">
+                  <a16:creationId xmlns:a16="http://schemas.microsoft.com/office/drawing/2014/main" id="{FC96794E-3785-43A9-8845-6AE5618B1BBA}"/>
+                </a:ext>
+              </a:extLst>
+            </p:cNvPr>
+            <p:cNvGrpSpPr/>
+            <p:nvPr/>
+          </p:nvGrpSpPr>
+          <p:grpSpPr>
+            <a:xfrm>
+              <a:off x="4624182" y="1940880"/>
+              <a:ext cx="2509106" cy="2649215"/>
+              <a:chOff x="3807110" y="2057430"/>
+              <a:chExt cx="2509106" cy="2649215"/>
+            </a:xfrm>
+            <a:solidFill>
+              <a:srgbClr val="FF9F11"/>
+            </a:solidFill>
+          </p:grpSpPr>
+          <p:sp>
+            <p:nvSpPr>
+              <p:cNvPr id="18" name="Block Arc 17">
+                <a:extLst>
+                  <a:ext uri="{FF2B5EF4-FFF2-40B4-BE49-F238E27FC236}">
+                    <a16:creationId xmlns:a16="http://schemas.microsoft.com/office/drawing/2014/main" id="{2BF24605-288D-45AC-A280-B160C42108B3}"/>
+                  </a:ext>
+                </a:extLst>
+              </p:cNvPr>
+              <p:cNvSpPr/>
+              <p:nvPr/>
+            </p:nvSpPr>
+            <p:spPr>
+              <a:xfrm>
+                <a:off x="4261400" y="2787693"/>
+                <a:ext cx="1539025" cy="1918952"/>
+              </a:xfrm>
+              <a:prstGeom prst="blockArc">
+                <a:avLst>
+                  <a:gd name="adj1" fmla="val 10800000"/>
+                  <a:gd name="adj2" fmla="val 21361144"/>
+                  <a:gd name="adj3" fmla="val 21000"/>
+                </a:avLst>
+              </a:prstGeom>
+              <a:solidFill>
+                <a:srgbClr val="7F2496"/>
+              </a:solidFill>
+              <a:ln>
+                <a:noFill/>
+              </a:ln>
+            </p:spPr>
+            <p:style>
+              <a:lnRef idx="2">
+                <a:schemeClr val="accent1">
+                  <a:shade val="50000"/>
+                </a:schemeClr>
+              </a:lnRef>
+              <a:fillRef idx="1">
+                <a:schemeClr val="accent1"/>
+              </a:fillRef>
+              <a:effectRef idx="0">
+                <a:schemeClr val="accent1"/>
+              </a:effectRef>
+              <a:fontRef idx="minor">
+                <a:schemeClr val="lt1"/>
+              </a:fontRef>
+            </p:style>
+            <p:txBody>
+              <a:bodyPr rtlCol="0" anchor="ctr"/>
+              <a:lstStyle/>
+              <a:p>
+                <a:pPr algn="ctr"/>
+                <a:endParaRPr lang="en-PH">
+                  <a:solidFill>
+                    <a:schemeClr val="tx1"/>
+                  </a:solidFill>
+                </a:endParaRPr>
+              </a:p>
+            </p:txBody>
+          </p:sp>
+          <p:grpSp>
+            <p:nvGrpSpPr>
+              <p:cNvPr id="19" name="Group 18">
+                <a:extLst>
+                  <a:ext uri="{FF2B5EF4-FFF2-40B4-BE49-F238E27FC236}">
+                    <a16:creationId xmlns:a16="http://schemas.microsoft.com/office/drawing/2014/main" id="{C93FC48A-F2CE-46D0-BB89-775B93E8B37D}"/>
+                  </a:ext>
+                </a:extLst>
+              </p:cNvPr>
+              <p:cNvGrpSpPr/>
+              <p:nvPr/>
+            </p:nvGrpSpPr>
+            <p:grpSpPr>
+              <a:xfrm>
+                <a:off x="3807110" y="2057430"/>
+                <a:ext cx="2509106" cy="1053414"/>
+                <a:chOff x="5197760" y="2642265"/>
+                <a:chExt cx="2509106" cy="1053414"/>
+              </a:xfrm>
+              <a:grpFill/>
+            </p:grpSpPr>
+            <p:sp>
+              <p:nvSpPr>
+                <p:cNvPr id="23" name="Rectangle 22">
+                  <a:extLst>
+                    <a:ext uri="{FF2B5EF4-FFF2-40B4-BE49-F238E27FC236}">
+                      <a16:creationId xmlns:a16="http://schemas.microsoft.com/office/drawing/2014/main" id="{0F8515C0-3CBB-46FE-A84E-20FAFA86A8C7}"/>
+                    </a:ext>
+                  </a:extLst>
+                </p:cNvPr>
+                <p:cNvSpPr/>
+                <p:nvPr/>
+              </p:nvSpPr>
+              <p:spPr>
+                <a:xfrm rot="5400000">
+                  <a:off x="5566259" y="2422888"/>
+                  <a:ext cx="294587" cy="1031585"/>
+                </a:xfrm>
+                <a:prstGeom prst="rect">
+                  <a:avLst/>
+                </a:prstGeom>
+                <a:solidFill>
+                  <a:srgbClr val="7F2496"/>
+                </a:solidFill>
+                <a:ln>
+                  <a:noFill/>
+                </a:ln>
+              </p:spPr>
+              <p:style>
+                <a:lnRef idx="2">
+                  <a:schemeClr val="accent1">
+                    <a:shade val="50000"/>
+                  </a:schemeClr>
+                </a:lnRef>
+                <a:fillRef idx="1">
+                  <a:schemeClr val="accent1"/>
+                </a:fillRef>
+                <a:effectRef idx="0">
+                  <a:schemeClr val="accent1"/>
+                </a:effectRef>
+                <a:fontRef idx="minor">
+                  <a:schemeClr val="lt1"/>
+                </a:fontRef>
+              </p:style>
+              <p:txBody>
+                <a:bodyPr rtlCol="0" anchor="ctr"/>
+                <a:lstStyle/>
+                <a:p>
+                  <a:pPr algn="ctr"/>
+                  <a:endParaRPr lang="en-PH"/>
+                </a:p>
+              </p:txBody>
+            </p:sp>
+            <p:sp>
+              <p:nvSpPr>
+                <p:cNvPr id="24" name="Rectangle 23">
+                  <a:extLst>
+                    <a:ext uri="{FF2B5EF4-FFF2-40B4-BE49-F238E27FC236}">
+                      <a16:creationId xmlns:a16="http://schemas.microsoft.com/office/drawing/2014/main" id="{343F5142-5A11-40D4-AD34-81D3273B8ABC}"/>
+                    </a:ext>
+                  </a:extLst>
+                </p:cNvPr>
+                <p:cNvSpPr/>
+                <p:nvPr/>
+              </p:nvSpPr>
+              <p:spPr>
+                <a:xfrm rot="16200000">
+                  <a:off x="7043780" y="2422887"/>
+                  <a:ext cx="294587" cy="1031585"/>
+                </a:xfrm>
+                <a:prstGeom prst="rect">
+                  <a:avLst/>
+                </a:prstGeom>
+                <a:solidFill>
+                  <a:srgbClr val="7F2496"/>
+                </a:solidFill>
+                <a:ln>
+                  <a:noFill/>
+                </a:ln>
+              </p:spPr>
+              <p:style>
+                <a:lnRef idx="2">
+                  <a:schemeClr val="accent1">
+                    <a:shade val="50000"/>
+                  </a:schemeClr>
+                </a:lnRef>
+                <a:fillRef idx="1">
+                  <a:schemeClr val="accent1"/>
+                </a:fillRef>
+                <a:effectRef idx="0">
+                  <a:schemeClr val="accent1"/>
+                </a:effectRef>
+                <a:fontRef idx="minor">
+                  <a:schemeClr val="lt1"/>
+                </a:fontRef>
+              </p:style>
+              <p:txBody>
+                <a:bodyPr rtlCol="0" anchor="ctr"/>
+                <a:lstStyle/>
+                <a:p>
+                  <a:pPr algn="ctr"/>
+                  <a:endParaRPr lang="en-PH"/>
+                </a:p>
+              </p:txBody>
+            </p:sp>
+            <p:sp>
+              <p:nvSpPr>
+                <p:cNvPr id="25" name="Freeform: Shape 24">
+                  <a:extLst>
+                    <a:ext uri="{FF2B5EF4-FFF2-40B4-BE49-F238E27FC236}">
+                      <a16:creationId xmlns:a16="http://schemas.microsoft.com/office/drawing/2014/main" id="{025FFF3E-6B02-41AE-A7A7-662D1EC6B4DF}"/>
+                    </a:ext>
+                  </a:extLst>
+                </p:cNvPr>
+                <p:cNvSpPr/>
+                <p:nvPr/>
+              </p:nvSpPr>
+              <p:spPr>
+                <a:xfrm>
+                  <a:off x="5894855" y="2642265"/>
+                  <a:ext cx="1053414" cy="1053414"/>
+                </a:xfrm>
+                <a:custGeom>
+                  <a:avLst/>
+                  <a:gdLst>
+                    <a:gd name="connsiteX0" fmla="*/ 579549 w 1159098"/>
+                    <a:gd name="connsiteY0" fmla="*/ 356193 h 1159098"/>
+                    <a:gd name="connsiteX1" fmla="*/ 356193 w 1159098"/>
+                    <a:gd name="connsiteY1" fmla="*/ 579549 h 1159098"/>
+                    <a:gd name="connsiteX2" fmla="*/ 579549 w 1159098"/>
+                    <a:gd name="connsiteY2" fmla="*/ 802905 h 1159098"/>
+                    <a:gd name="connsiteX3" fmla="*/ 802905 w 1159098"/>
+                    <a:gd name="connsiteY3" fmla="*/ 579549 h 1159098"/>
+                    <a:gd name="connsiteX4" fmla="*/ 579549 w 1159098"/>
+                    <a:gd name="connsiteY4" fmla="*/ 356193 h 1159098"/>
+                    <a:gd name="connsiteX5" fmla="*/ 579549 w 1159098"/>
+                    <a:gd name="connsiteY5" fmla="*/ 0 h 1159098"/>
+                    <a:gd name="connsiteX6" fmla="*/ 1159098 w 1159098"/>
+                    <a:gd name="connsiteY6" fmla="*/ 579549 h 1159098"/>
+                    <a:gd name="connsiteX7" fmla="*/ 579549 w 1159098"/>
+                    <a:gd name="connsiteY7" fmla="*/ 1159098 h 1159098"/>
+                    <a:gd name="connsiteX8" fmla="*/ 0 w 1159098"/>
+                    <a:gd name="connsiteY8" fmla="*/ 579549 h 1159098"/>
+                    <a:gd name="connsiteX9" fmla="*/ 579549 w 1159098"/>
+                    <a:gd name="connsiteY9" fmla="*/ 0 h 1159098"/>
+                  </a:gdLst>
+                  <a:ahLst/>
+                  <a:cxnLst>
+                    <a:cxn ang="0">
+                      <a:pos x="connsiteX0" y="connsiteY0"/>
+                    </a:cxn>
+                    <a:cxn ang="0">
+                      <a:pos x="connsiteX1" y="connsiteY1"/>
+                    </a:cxn>
+                    <a:cxn ang="0">
+                      <a:pos x="connsiteX2" y="connsiteY2"/>
+                    </a:cxn>
+                    <a:cxn ang="0">
+                      <a:pos x="connsiteX3" y="connsiteY3"/>
+                    </a:cxn>
+                    <a:cxn ang="0">
+                      <a:pos x="connsiteX4" y="connsiteY4"/>
+                    </a:cxn>
+                    <a:cxn ang="0">
+                      <a:pos x="connsiteX5" y="connsiteY5"/>
+                    </a:cxn>
+                    <a:cxn ang="0">
+                      <a:pos x="connsiteX6" y="connsiteY6"/>
+                    </a:cxn>
+                    <a:cxn ang="0">
+                      <a:pos x="connsiteX7" y="connsiteY7"/>
+                    </a:cxn>
+                    <a:cxn ang="0">
+                      <a:pos x="connsiteX8" y="connsiteY8"/>
+                    </a:cxn>
+                    <a:cxn ang="0">
+                      <a:pos x="connsiteX9" y="connsiteY9"/>
+                    </a:cxn>
+                  </a:cxnLst>
+                  <a:rect l="l" t="t" r="r" b="b"/>
+                  <a:pathLst>
+                    <a:path w="1159098" h="1159098">
+                      <a:moveTo>
+                        <a:pt x="579549" y="356193"/>
+                      </a:moveTo>
+                      <a:cubicBezTo>
+                        <a:pt x="456193" y="356193"/>
+                        <a:pt x="356193" y="456193"/>
+                        <a:pt x="356193" y="579549"/>
+                      </a:cubicBezTo>
+                      <a:cubicBezTo>
+                        <a:pt x="356193" y="702905"/>
+                        <a:pt x="456193" y="802905"/>
+                        <a:pt x="579549" y="802905"/>
+                      </a:cubicBezTo>
+                      <a:cubicBezTo>
+                        <a:pt x="702905" y="802905"/>
+                        <a:pt x="802905" y="702905"/>
+                        <a:pt x="802905" y="579549"/>
+                      </a:cubicBezTo>
+                      <a:cubicBezTo>
+                        <a:pt x="802905" y="456193"/>
+                        <a:pt x="702905" y="356193"/>
+                        <a:pt x="579549" y="356193"/>
+                      </a:cubicBezTo>
+                      <a:close/>
+                      <a:moveTo>
+                        <a:pt x="579549" y="0"/>
+                      </a:moveTo>
+                      <a:cubicBezTo>
+                        <a:pt x="899625" y="0"/>
+                        <a:pt x="1159098" y="259473"/>
+                        <a:pt x="1159098" y="579549"/>
+                      </a:cubicBezTo>
+                      <a:cubicBezTo>
+                        <a:pt x="1159098" y="899625"/>
+                        <a:pt x="899625" y="1159098"/>
+                        <a:pt x="579549" y="1159098"/>
+                      </a:cubicBezTo>
+                      <a:cubicBezTo>
+                        <a:pt x="259473" y="1159098"/>
+                        <a:pt x="0" y="899625"/>
+                        <a:pt x="0" y="579549"/>
+                      </a:cubicBezTo>
+                      <a:cubicBezTo>
+                        <a:pt x="0" y="259473"/>
+                        <a:pt x="259473" y="0"/>
+                        <a:pt x="579549" y="0"/>
+                      </a:cubicBezTo>
+                      <a:close/>
+                    </a:path>
+                  </a:pathLst>
+                </a:custGeom>
+                <a:solidFill>
+                  <a:srgbClr val="7F2496"/>
+                </a:solidFill>
+                <a:ln>
+                  <a:noFill/>
+                </a:ln>
+              </p:spPr>
+              <p:style>
+                <a:lnRef idx="2">
+                  <a:schemeClr val="accent1">
+                    <a:shade val="50000"/>
+                  </a:schemeClr>
+                </a:lnRef>
+                <a:fillRef idx="1">
+                  <a:schemeClr val="accent1"/>
+                </a:fillRef>
+                <a:effectRef idx="0">
+                  <a:schemeClr val="accent1"/>
+                </a:effectRef>
+                <a:fontRef idx="minor">
+                  <a:schemeClr val="lt1"/>
+                </a:fontRef>
+              </p:style>
+              <p:txBody>
+                <a:bodyPr rtlCol="0" anchor="ctr"/>
+                <a:lstStyle/>
+                <a:p>
+                  <a:pPr algn="ctr"/>
+                  <a:endParaRPr lang="en-PH"/>
+                </a:p>
+              </p:txBody>
+            </p:sp>
+          </p:grpSp>
+          <p:sp>
+            <p:nvSpPr>
+              <p:cNvPr id="20" name="Rectangle 19">
+                <a:extLst>
+                  <a:ext uri="{FF2B5EF4-FFF2-40B4-BE49-F238E27FC236}">
+                    <a16:creationId xmlns:a16="http://schemas.microsoft.com/office/drawing/2014/main" id="{134F1498-929D-4F46-AD4F-C9AD7823FB9E}"/>
+                  </a:ext>
+                </a:extLst>
+              </p:cNvPr>
+              <p:cNvSpPr/>
+              <p:nvPr/>
+            </p:nvSpPr>
+            <p:spPr>
+              <a:xfrm>
+                <a:off x="5476379" y="3673495"/>
+                <a:ext cx="324046" cy="656126"/>
+              </a:xfrm>
+              <a:prstGeom prst="rect">
+                <a:avLst/>
+              </a:prstGeom>
+              <a:solidFill>
+                <a:srgbClr val="7F2496"/>
+              </a:solidFill>
+              <a:ln>
+                <a:noFill/>
+              </a:ln>
+            </p:spPr>
+            <p:style>
+              <a:lnRef idx="2">
+                <a:schemeClr val="accent1">
+                  <a:shade val="50000"/>
+                </a:schemeClr>
+              </a:lnRef>
+              <a:fillRef idx="1">
+                <a:schemeClr val="accent1"/>
+              </a:fillRef>
+              <a:effectRef idx="0">
+                <a:schemeClr val="accent1"/>
+              </a:effectRef>
+              <a:fontRef idx="minor">
+                <a:schemeClr val="lt1"/>
+              </a:fontRef>
+            </p:style>
+            <p:txBody>
+              <a:bodyPr rtlCol="0" anchor="ctr"/>
+              <a:lstStyle/>
+              <a:p>
+                <a:pPr algn="ctr"/>
+                <a:endParaRPr lang="en-PH"/>
+              </a:p>
+            </p:txBody>
+          </p:sp>
+          <p:sp>
+            <p:nvSpPr>
+              <p:cNvPr id="21" name="Rectangle 20">
+                <a:extLst>
+                  <a:ext uri="{FF2B5EF4-FFF2-40B4-BE49-F238E27FC236}">
+                    <a16:creationId xmlns:a16="http://schemas.microsoft.com/office/drawing/2014/main" id="{5933A8F7-6562-44A9-99F2-E2931901EADA}"/>
+                  </a:ext>
+                </a:extLst>
+              </p:cNvPr>
+              <p:cNvSpPr/>
+              <p:nvPr/>
+            </p:nvSpPr>
+            <p:spPr>
+              <a:xfrm>
+                <a:off x="4261400" y="3744787"/>
+                <a:ext cx="324046" cy="584833"/>
+              </a:xfrm>
+              <a:prstGeom prst="rect">
+                <a:avLst/>
+              </a:prstGeom>
+              <a:solidFill>
+                <a:srgbClr val="7F2496"/>
+              </a:solidFill>
+              <a:ln>
+                <a:noFill/>
+              </a:ln>
+            </p:spPr>
+            <p:style>
+              <a:lnRef idx="2">
+                <a:schemeClr val="accent1">
+                  <a:shade val="50000"/>
+                </a:schemeClr>
+              </a:lnRef>
+              <a:fillRef idx="1">
+                <a:schemeClr val="accent1"/>
+              </a:fillRef>
+              <a:effectRef idx="0">
+                <a:schemeClr val="accent1"/>
+              </a:effectRef>
+              <a:fontRef idx="minor">
+                <a:schemeClr val="lt1"/>
+              </a:fontRef>
+            </p:style>
+            <p:txBody>
+              <a:bodyPr rtlCol="0" anchor="ctr"/>
+              <a:lstStyle/>
+              <a:p>
+                <a:pPr algn="ctr"/>
+                <a:endParaRPr lang="en-PH"/>
+              </a:p>
+            </p:txBody>
+          </p:sp>
+          <p:sp>
+            <p:nvSpPr>
+              <p:cNvPr id="22" name="Rectangle 21">
+                <a:extLst>
+                  <a:ext uri="{FF2B5EF4-FFF2-40B4-BE49-F238E27FC236}">
+                    <a16:creationId xmlns:a16="http://schemas.microsoft.com/office/drawing/2014/main" id="{BB70FF97-9C12-4F20-AFA0-8A6037618683}"/>
+                  </a:ext>
+                </a:extLst>
+              </p:cNvPr>
+              <p:cNvSpPr/>
+              <p:nvPr/>
+            </p:nvSpPr>
+            <p:spPr>
+              <a:xfrm>
+                <a:off x="4868889" y="3744787"/>
+                <a:ext cx="324046" cy="961858"/>
+              </a:xfrm>
+              <a:prstGeom prst="rect">
+                <a:avLst/>
+              </a:prstGeom>
+              <a:solidFill>
+                <a:srgbClr val="7F2496"/>
+              </a:solidFill>
+              <a:ln>
+                <a:noFill/>
+              </a:ln>
+            </p:spPr>
+            <p:style>
+              <a:lnRef idx="2">
+                <a:schemeClr val="accent1">
+                  <a:shade val="50000"/>
+                </a:schemeClr>
+              </a:lnRef>
+              <a:fillRef idx="1">
+                <a:schemeClr val="accent1"/>
+              </a:fillRef>
+              <a:effectRef idx="0">
+                <a:schemeClr val="accent1"/>
+              </a:effectRef>
+              <a:fontRef idx="minor">
+                <a:schemeClr val="lt1"/>
+              </a:fontRef>
+            </p:style>
+            <p:txBody>
+              <a:bodyPr rtlCol="0" anchor="ctr"/>
+              <a:lstStyle/>
+              <a:p>
+                <a:pPr algn="ctr"/>
+                <a:endParaRPr lang="en-PH"/>
+              </a:p>
+            </p:txBody>
+          </p:sp>
+        </p:grpSp>
+      </p:grpSp>
+    </p:spTree>
+    <p:extLst>
+      <p:ext uri="{BB962C8B-B14F-4D97-AF65-F5344CB8AC3E}">
+        <p14:creationId xmlns:p14="http://schemas.microsoft.com/office/powerpoint/2010/main" val="1596673351"/>
       </p:ext>
     </p:extLst>
   </p:cSld>

</xml_diff>

<commit_message>
created post blog page and added tinymce plugin
</commit_message>
<xml_diff>
--- a/assets/images/raw.pptx
+++ b/assets/images/raw.pptx
@@ -8,6 +8,7 @@
     <p:sldId id="256" r:id="rId2"/>
     <p:sldId id="257" r:id="rId3"/>
     <p:sldId id="258" r:id="rId4"/>
+    <p:sldId id="259" r:id="rId5"/>
   </p:sldIdLst>
   <p:sldSz cx="12192000" cy="6858000"/>
   <p:notesSz cx="6858000" cy="9144000"/>
@@ -263,7 +264,7 @@
           <a:p>
             <a:fld id="{57BFE527-FE1D-423E-9D0C-B83608467F47}" type="datetimeFigureOut">
               <a:rPr lang="en-PH" smtClean="0"/>
-              <a:t>3 Mar 2020</a:t>
+              <a:t>7 Mar 2020</a:t>
             </a:fld>
             <a:endParaRPr lang="en-PH"/>
           </a:p>
@@ -463,7 +464,7 @@
           <a:p>
             <a:fld id="{57BFE527-FE1D-423E-9D0C-B83608467F47}" type="datetimeFigureOut">
               <a:rPr lang="en-PH" smtClean="0"/>
-              <a:t>3 Mar 2020</a:t>
+              <a:t>7 Mar 2020</a:t>
             </a:fld>
             <a:endParaRPr lang="en-PH"/>
           </a:p>
@@ -673,7 +674,7 @@
           <a:p>
             <a:fld id="{57BFE527-FE1D-423E-9D0C-B83608467F47}" type="datetimeFigureOut">
               <a:rPr lang="en-PH" smtClean="0"/>
-              <a:t>3 Mar 2020</a:t>
+              <a:t>7 Mar 2020</a:t>
             </a:fld>
             <a:endParaRPr lang="en-PH"/>
           </a:p>
@@ -873,7 +874,7 @@
           <a:p>
             <a:fld id="{57BFE527-FE1D-423E-9D0C-B83608467F47}" type="datetimeFigureOut">
               <a:rPr lang="en-PH" smtClean="0"/>
-              <a:t>3 Mar 2020</a:t>
+              <a:t>7 Mar 2020</a:t>
             </a:fld>
             <a:endParaRPr lang="en-PH"/>
           </a:p>
@@ -1149,7 +1150,7 @@
           <a:p>
             <a:fld id="{57BFE527-FE1D-423E-9D0C-B83608467F47}" type="datetimeFigureOut">
               <a:rPr lang="en-PH" smtClean="0"/>
-              <a:t>3 Mar 2020</a:t>
+              <a:t>7 Mar 2020</a:t>
             </a:fld>
             <a:endParaRPr lang="en-PH"/>
           </a:p>
@@ -1417,7 +1418,7 @@
           <a:p>
             <a:fld id="{57BFE527-FE1D-423E-9D0C-B83608467F47}" type="datetimeFigureOut">
               <a:rPr lang="en-PH" smtClean="0"/>
-              <a:t>3 Mar 2020</a:t>
+              <a:t>7 Mar 2020</a:t>
             </a:fld>
             <a:endParaRPr lang="en-PH"/>
           </a:p>
@@ -1832,7 +1833,7 @@
           <a:p>
             <a:fld id="{57BFE527-FE1D-423E-9D0C-B83608467F47}" type="datetimeFigureOut">
               <a:rPr lang="en-PH" smtClean="0"/>
-              <a:t>3 Mar 2020</a:t>
+              <a:t>7 Mar 2020</a:t>
             </a:fld>
             <a:endParaRPr lang="en-PH"/>
           </a:p>
@@ -1974,7 +1975,7 @@
           <a:p>
             <a:fld id="{57BFE527-FE1D-423E-9D0C-B83608467F47}" type="datetimeFigureOut">
               <a:rPr lang="en-PH" smtClean="0"/>
-              <a:t>3 Mar 2020</a:t>
+              <a:t>7 Mar 2020</a:t>
             </a:fld>
             <a:endParaRPr lang="en-PH"/>
           </a:p>
@@ -2087,7 +2088,7 @@
           <a:p>
             <a:fld id="{57BFE527-FE1D-423E-9D0C-B83608467F47}" type="datetimeFigureOut">
               <a:rPr lang="en-PH" smtClean="0"/>
-              <a:t>3 Mar 2020</a:t>
+              <a:t>7 Mar 2020</a:t>
             </a:fld>
             <a:endParaRPr lang="en-PH"/>
           </a:p>
@@ -2400,7 +2401,7 @@
           <a:p>
             <a:fld id="{57BFE527-FE1D-423E-9D0C-B83608467F47}" type="datetimeFigureOut">
               <a:rPr lang="en-PH" smtClean="0"/>
-              <a:t>3 Mar 2020</a:t>
+              <a:t>7 Mar 2020</a:t>
             </a:fld>
             <a:endParaRPr lang="en-PH"/>
           </a:p>
@@ -2689,7 +2690,7 @@
           <a:p>
             <a:fld id="{57BFE527-FE1D-423E-9D0C-B83608467F47}" type="datetimeFigureOut">
               <a:rPr lang="en-PH" smtClean="0"/>
-              <a:t>3 Mar 2020</a:t>
+              <a:t>7 Mar 2020</a:t>
             </a:fld>
             <a:endParaRPr lang="en-PH"/>
           </a:p>
@@ -2937,7 +2938,7 @@
           <a:p>
             <a:fld id="{57BFE527-FE1D-423E-9D0C-B83608467F47}" type="datetimeFigureOut">
               <a:rPr lang="en-PH" smtClean="0"/>
-              <a:t>3 Mar 2020</a:t>
+              <a:t>7 Mar 2020</a:t>
             </a:fld>
             <a:endParaRPr lang="en-PH"/>
           </a:p>
@@ -5918,6 +5919,91 @@
 </p:sld>
 </file>
 
+<file path=ppt/slides/slide4.xml><?xml version="1.0" encoding="utf-8"?>
+<p:sld xmlns:a="http://schemas.openxmlformats.org/drawingml/2006/main" xmlns:r="http://schemas.openxmlformats.org/officeDocument/2006/relationships" xmlns:p="http://schemas.openxmlformats.org/presentationml/2006/main">
+  <p:cSld>
+    <p:bg>
+      <p:bgPr>
+        <a:solidFill>
+          <a:schemeClr val="bg1">
+            <a:lumMod val="50000"/>
+          </a:schemeClr>
+        </a:solidFill>
+        <a:effectLst/>
+      </p:bgPr>
+    </p:bg>
+    <p:spTree>
+      <p:nvGrpSpPr>
+        <p:cNvPr id="1" name=""/>
+        <p:cNvGrpSpPr/>
+        <p:nvPr/>
+      </p:nvGrpSpPr>
+      <p:grpSpPr>
+        <a:xfrm>
+          <a:off x="0" y="0"/>
+          <a:ext cx="0" cy="0"/>
+          <a:chOff x="0" y="0"/>
+          <a:chExt cx="0" cy="0"/>
+        </a:xfrm>
+      </p:grpSpPr>
+      <p:pic>
+        <p:nvPicPr>
+          <p:cNvPr id="1026" name="Picture 2" descr="Image result for image placeholder">
+            <a:extLst>
+              <a:ext uri="{FF2B5EF4-FFF2-40B4-BE49-F238E27FC236}">
+                <a16:creationId xmlns:a16="http://schemas.microsoft.com/office/drawing/2014/main" id="{8B25772F-BB86-4FDE-B6DB-2200C00CE5B7}"/>
+              </a:ext>
+            </a:extLst>
+          </p:cNvPr>
+          <p:cNvPicPr>
+            <a:picLocks noChangeAspect="1" noChangeArrowheads="1"/>
+          </p:cNvPicPr>
+          <p:nvPr/>
+        </p:nvPicPr>
+        <p:blipFill rotWithShape="1">
+          <a:blip r:embed="rId2">
+            <a:extLst>
+              <a:ext uri="{28A0092B-C50C-407E-A947-70E740481C1C}">
+                <a14:useLocalDpi xmlns:a14="http://schemas.microsoft.com/office/drawing/2010/main" val="0"/>
+              </a:ext>
+            </a:extLst>
+          </a:blip>
+          <a:srcRect l="31824" t="12343" r="32180" b="10856"/>
+          <a:stretch/>
+        </p:blipFill>
+        <p:spPr bwMode="auto">
+          <a:xfrm>
+            <a:off x="4018208" y="1635616"/>
+            <a:ext cx="3721995" cy="3308738"/>
+          </a:xfrm>
+          <a:prstGeom prst="rect">
+            <a:avLst/>
+          </a:prstGeom>
+          <a:noFill/>
+          <a:extLst>
+            <a:ext uri="{909E8E84-426E-40DD-AFC4-6F175D3DCCD1}">
+              <a14:hiddenFill xmlns:a14="http://schemas.microsoft.com/office/drawing/2010/main">
+                <a:solidFill>
+                  <a:srgbClr val="FFFFFF"/>
+                </a:solidFill>
+              </a14:hiddenFill>
+            </a:ext>
+          </a:extLst>
+        </p:spPr>
+      </p:pic>
+    </p:spTree>
+    <p:extLst>
+      <p:ext uri="{BB962C8B-B14F-4D97-AF65-F5344CB8AC3E}">
+        <p14:creationId xmlns:p14="http://schemas.microsoft.com/office/powerpoint/2010/main" val="2416786399"/>
+      </p:ext>
+    </p:extLst>
+  </p:cSld>
+  <p:clrMapOvr>
+    <a:masterClrMapping/>
+  </p:clrMapOvr>
+</p:sld>
+</file>
+
 <file path=ppt/theme/theme1.xml><?xml version="1.0" encoding="utf-8"?>
 <a:theme xmlns:a="http://schemas.openxmlformats.org/drawingml/2006/main" name="Office Theme">
   <a:themeElements>

</xml_diff>

<commit_message>
added google analytics code
</commit_message>
<xml_diff>
--- a/assets/images/raw.pptx
+++ b/assets/images/raw.pptx
@@ -9,6 +9,7 @@
     <p:sldId id="257" r:id="rId3"/>
     <p:sldId id="258" r:id="rId4"/>
     <p:sldId id="259" r:id="rId5"/>
+    <p:sldId id="260" r:id="rId6"/>
   </p:sldIdLst>
   <p:sldSz cx="12192000" cy="6858000"/>
   <p:notesSz cx="6858000" cy="9144000"/>
@@ -264,7 +265,7 @@
           <a:p>
             <a:fld id="{57BFE527-FE1D-423E-9D0C-B83608467F47}" type="datetimeFigureOut">
               <a:rPr lang="en-PH" smtClean="0"/>
-              <a:t>7 Mar 2020</a:t>
+              <a:t>10 Mar 2020</a:t>
             </a:fld>
             <a:endParaRPr lang="en-PH"/>
           </a:p>
@@ -464,7 +465,7 @@
           <a:p>
             <a:fld id="{57BFE527-FE1D-423E-9D0C-B83608467F47}" type="datetimeFigureOut">
               <a:rPr lang="en-PH" smtClean="0"/>
-              <a:t>7 Mar 2020</a:t>
+              <a:t>10 Mar 2020</a:t>
             </a:fld>
             <a:endParaRPr lang="en-PH"/>
           </a:p>
@@ -674,7 +675,7 @@
           <a:p>
             <a:fld id="{57BFE527-FE1D-423E-9D0C-B83608467F47}" type="datetimeFigureOut">
               <a:rPr lang="en-PH" smtClean="0"/>
-              <a:t>7 Mar 2020</a:t>
+              <a:t>10 Mar 2020</a:t>
             </a:fld>
             <a:endParaRPr lang="en-PH"/>
           </a:p>
@@ -874,7 +875,7 @@
           <a:p>
             <a:fld id="{57BFE527-FE1D-423E-9D0C-B83608467F47}" type="datetimeFigureOut">
               <a:rPr lang="en-PH" smtClean="0"/>
-              <a:t>7 Mar 2020</a:t>
+              <a:t>10 Mar 2020</a:t>
             </a:fld>
             <a:endParaRPr lang="en-PH"/>
           </a:p>
@@ -1150,7 +1151,7 @@
           <a:p>
             <a:fld id="{57BFE527-FE1D-423E-9D0C-B83608467F47}" type="datetimeFigureOut">
               <a:rPr lang="en-PH" smtClean="0"/>
-              <a:t>7 Mar 2020</a:t>
+              <a:t>10 Mar 2020</a:t>
             </a:fld>
             <a:endParaRPr lang="en-PH"/>
           </a:p>
@@ -1418,7 +1419,7 @@
           <a:p>
             <a:fld id="{57BFE527-FE1D-423E-9D0C-B83608467F47}" type="datetimeFigureOut">
               <a:rPr lang="en-PH" smtClean="0"/>
-              <a:t>7 Mar 2020</a:t>
+              <a:t>10 Mar 2020</a:t>
             </a:fld>
             <a:endParaRPr lang="en-PH"/>
           </a:p>
@@ -1833,7 +1834,7 @@
           <a:p>
             <a:fld id="{57BFE527-FE1D-423E-9D0C-B83608467F47}" type="datetimeFigureOut">
               <a:rPr lang="en-PH" smtClean="0"/>
-              <a:t>7 Mar 2020</a:t>
+              <a:t>10 Mar 2020</a:t>
             </a:fld>
             <a:endParaRPr lang="en-PH"/>
           </a:p>
@@ -1975,7 +1976,7 @@
           <a:p>
             <a:fld id="{57BFE527-FE1D-423E-9D0C-B83608467F47}" type="datetimeFigureOut">
               <a:rPr lang="en-PH" smtClean="0"/>
-              <a:t>7 Mar 2020</a:t>
+              <a:t>10 Mar 2020</a:t>
             </a:fld>
             <a:endParaRPr lang="en-PH"/>
           </a:p>
@@ -2088,7 +2089,7 @@
           <a:p>
             <a:fld id="{57BFE527-FE1D-423E-9D0C-B83608467F47}" type="datetimeFigureOut">
               <a:rPr lang="en-PH" smtClean="0"/>
-              <a:t>7 Mar 2020</a:t>
+              <a:t>10 Mar 2020</a:t>
             </a:fld>
             <a:endParaRPr lang="en-PH"/>
           </a:p>
@@ -2401,7 +2402,7 @@
           <a:p>
             <a:fld id="{57BFE527-FE1D-423E-9D0C-B83608467F47}" type="datetimeFigureOut">
               <a:rPr lang="en-PH" smtClean="0"/>
-              <a:t>7 Mar 2020</a:t>
+              <a:t>10 Mar 2020</a:t>
             </a:fld>
             <a:endParaRPr lang="en-PH"/>
           </a:p>
@@ -2690,7 +2691,7 @@
           <a:p>
             <a:fld id="{57BFE527-FE1D-423E-9D0C-B83608467F47}" type="datetimeFigureOut">
               <a:rPr lang="en-PH" smtClean="0"/>
-              <a:t>7 Mar 2020</a:t>
+              <a:t>10 Mar 2020</a:t>
             </a:fld>
             <a:endParaRPr lang="en-PH"/>
           </a:p>
@@ -2938,7 +2939,7 @@
           <a:p>
             <a:fld id="{57BFE527-FE1D-423E-9D0C-B83608467F47}" type="datetimeFigureOut">
               <a:rPr lang="en-PH" smtClean="0"/>
-              <a:t>7 Mar 2020</a:t>
+              <a:t>10 Mar 2020</a:t>
             </a:fld>
             <a:endParaRPr lang="en-PH"/>
           </a:p>
@@ -6004,6 +6005,83 @@
 </p:sld>
 </file>
 
+<file path=ppt/slides/slide5.xml><?xml version="1.0" encoding="utf-8"?>
+<p:sld xmlns:a="http://schemas.openxmlformats.org/drawingml/2006/main" xmlns:r="http://schemas.openxmlformats.org/officeDocument/2006/relationships" xmlns:p="http://schemas.openxmlformats.org/presentationml/2006/main">
+  <p:cSld>
+    <p:spTree>
+      <p:nvGrpSpPr>
+        <p:cNvPr id="1" name=""/>
+        <p:cNvGrpSpPr/>
+        <p:nvPr/>
+      </p:nvGrpSpPr>
+      <p:grpSpPr>
+        <a:xfrm>
+          <a:off x="0" y="0"/>
+          <a:ext cx="0" cy="0"/>
+          <a:chOff x="0" y="0"/>
+          <a:chExt cx="0" cy="0"/>
+        </a:xfrm>
+      </p:grpSpPr>
+      <p:pic>
+        <p:nvPicPr>
+          <p:cNvPr id="1026" name="Picture 2">
+            <a:extLst>
+              <a:ext uri="{FF2B5EF4-FFF2-40B4-BE49-F238E27FC236}">
+                <a16:creationId xmlns:a16="http://schemas.microsoft.com/office/drawing/2014/main" id="{380557F6-BD73-49F6-8C9D-57090B0764CC}"/>
+              </a:ext>
+            </a:extLst>
+          </p:cNvPr>
+          <p:cNvPicPr>
+            <a:picLocks noChangeAspect="1" noChangeArrowheads="1"/>
+          </p:cNvPicPr>
+          <p:nvPr/>
+        </p:nvPicPr>
+        <p:blipFill>
+          <a:blip r:embed="rId2">
+            <a:extLst>
+              <a:ext uri="{28A0092B-C50C-407E-A947-70E740481C1C}">
+                <a14:useLocalDpi xmlns:a14="http://schemas.microsoft.com/office/drawing/2010/main" val="0"/>
+              </a:ext>
+            </a:extLst>
+          </a:blip>
+          <a:srcRect/>
+          <a:stretch>
+            <a:fillRect/>
+          </a:stretch>
+        </p:blipFill>
+        <p:spPr bwMode="auto">
+          <a:xfrm>
+            <a:off x="1381125" y="276225"/>
+            <a:ext cx="9429750" cy="6305550"/>
+          </a:xfrm>
+          <a:prstGeom prst="rect">
+            <a:avLst/>
+          </a:prstGeom>
+          <a:noFill/>
+          <a:extLst>
+            <a:ext uri="{909E8E84-426E-40DD-AFC4-6F175D3DCCD1}">
+              <a14:hiddenFill xmlns:a14="http://schemas.microsoft.com/office/drawing/2010/main">
+                <a:solidFill>
+                  <a:srgbClr val="FFFFFF"/>
+                </a:solidFill>
+              </a14:hiddenFill>
+            </a:ext>
+          </a:extLst>
+        </p:spPr>
+      </p:pic>
+    </p:spTree>
+    <p:extLst>
+      <p:ext uri="{BB962C8B-B14F-4D97-AF65-F5344CB8AC3E}">
+        <p14:creationId xmlns:p14="http://schemas.microsoft.com/office/powerpoint/2010/main" val="4240405463"/>
+      </p:ext>
+    </p:extLst>
+  </p:cSld>
+  <p:clrMapOvr>
+    <a:masterClrMapping/>
+  </p:clrMapOvr>
+</p:sld>
+</file>
+
 <file path=ppt/theme/theme1.xml><?xml version="1.0" encoding="utf-8"?>
 <a:theme xmlns:a="http://schemas.openxmlformats.org/drawingml/2006/main" name="Office Theme">
   <a:themeElements>

</xml_diff>